<commit_message>
poster progress 2 - ready for revision
</commit_message>
<xml_diff>
--- a/Box Score to Bracket- Evaluating the Predictive Power of NBA Regular Season Performance on Playoff Outcomes.pptx
+++ b/Box Score to Bracket- Evaluating the Predictive Power of NBA Regular Season Performance on Playoff Outcomes.pptx
@@ -5,11 +5,10 @@
     <p:sldMasterId id="2147483648" r:id="rId1"/>
   </p:sldMasterIdLst>
   <p:notesMasterIdLst>
-    <p:notesMasterId r:id="rId4"/>
+    <p:notesMasterId r:id="rId3"/>
   </p:notesMasterIdLst>
   <p:sldIdLst>
-    <p:sldId id="258" r:id="rId2"/>
-    <p:sldId id="259" r:id="rId3"/>
+    <p:sldId id="259" r:id="rId2"/>
   </p:sldIdLst>
   <p:sldSz cx="51206400" cy="32004000"/>
   <p:notesSz cx="32918400" cy="51206400"/>
@@ -735,296 +734,6 @@
         <p:cNvPr id="1" name="">
           <a:extLst>
             <a:ext uri="{FF2B5EF4-FFF2-40B4-BE49-F238E27FC236}">
-              <a16:creationId xmlns:a16="http://schemas.microsoft.com/office/drawing/2014/main" id="{45F55B20-645A-504B-C814-E9D3D6F255FD}"/>
-            </a:ext>
-          </a:extLst>
-        </p:cNvPr>
-        <p:cNvGrpSpPr/>
-        <p:nvPr/>
-      </p:nvGrpSpPr>
-      <p:grpSpPr>
-        <a:xfrm>
-          <a:off x="0" y="0"/>
-          <a:ext cx="0" cy="0"/>
-          <a:chOff x="0" y="0"/>
-          <a:chExt cx="0" cy="0"/>
-        </a:xfrm>
-      </p:grpSpPr>
-      <p:sp>
-        <p:nvSpPr>
-          <p:cNvPr id="15361" name="Slide Image Placeholder 1">
-            <a:extLst>
-              <a:ext uri="{FF2B5EF4-FFF2-40B4-BE49-F238E27FC236}">
-                <a16:creationId xmlns:a16="http://schemas.microsoft.com/office/drawing/2014/main" id="{54790E58-C6A0-D518-0567-DFEDFA6F0401}"/>
-              </a:ext>
-            </a:extLst>
-          </p:cNvPr>
-          <p:cNvSpPr>
-            <a:spLocks noGrp="1" noRot="1" noChangeAspect="1"/>
-          </p:cNvSpPr>
-          <p:nvPr>
-            <p:ph type="sldImg"/>
-          </p:nvPr>
-        </p:nvSpPr>
-        <p:spPr bwMode="auto">
-          <a:noFill/>
-          <a:ln>
-            <a:solidFill>
-              <a:srgbClr val="000000"/>
-            </a:solidFill>
-            <a:miter lim="800000"/>
-            <a:headEnd/>
-            <a:tailEnd/>
-          </a:ln>
-          <a:extLst>
-            <a:ext uri="{909E8E84-426E-40DD-AFC4-6F175D3DCCD1}">
-              <a14:hiddenFill xmlns:a14="http://schemas.microsoft.com/office/drawing/2010/main">
-                <a:solidFill>
-                  <a:srgbClr val="FFFFFF"/>
-                </a:solidFill>
-              </a14:hiddenFill>
-            </a:ext>
-          </a:extLst>
-        </p:spPr>
-      </p:sp>
-      <p:sp>
-        <p:nvSpPr>
-          <p:cNvPr id="15362" name="Notes Placeholder 2">
-            <a:extLst>
-              <a:ext uri="{FF2B5EF4-FFF2-40B4-BE49-F238E27FC236}">
-                <a16:creationId xmlns:a16="http://schemas.microsoft.com/office/drawing/2014/main" id="{E4D1C33E-2430-1699-BA3E-2A2CA75D5306}"/>
-              </a:ext>
-            </a:extLst>
-          </p:cNvPr>
-          <p:cNvSpPr>
-            <a:spLocks noGrp="1"/>
-          </p:cNvSpPr>
-          <p:nvPr>
-            <p:ph type="body" idx="1"/>
-          </p:nvPr>
-        </p:nvSpPr>
-        <p:spPr bwMode="auto">
-          <a:noFill/>
-          <a:extLst>
-            <a:ext uri="{909E8E84-426E-40DD-AFC4-6F175D3DCCD1}">
-              <a14:hiddenFill xmlns:a14="http://schemas.microsoft.com/office/drawing/2010/main">
-                <a:solidFill>
-                  <a:srgbClr val="FFFFFF"/>
-                </a:solidFill>
-              </a14:hiddenFill>
-            </a:ext>
-            <a:ext uri="{91240B29-F687-4F45-9708-019B960494DF}">
-              <a14:hiddenLine xmlns:a14="http://schemas.microsoft.com/office/drawing/2010/main" w="9525">
-                <a:solidFill>
-                  <a:srgbClr val="000000"/>
-                </a:solidFill>
-                <a:miter lim="800000"/>
-                <a:headEnd/>
-                <a:tailEnd/>
-              </a14:hiddenLine>
-            </a:ext>
-          </a:extLst>
-        </p:spPr>
-        <p:txBody>
-          <a:bodyPr/>
-          <a:lstStyle/>
-          <a:p>
-            <a:pPr eaLnBrk="1" hangingPunct="1">
-              <a:spcBef>
-                <a:spcPct val="0"/>
-              </a:spcBef>
-            </a:pPr>
-            <a:endParaRPr lang="en-US" altLang="en-US" sz="9600">
-              <a:solidFill>
-                <a:srgbClr val="000000"/>
-              </a:solidFill>
-            </a:endParaRPr>
-          </a:p>
-        </p:txBody>
-      </p:sp>
-      <p:sp>
-        <p:nvSpPr>
-          <p:cNvPr id="15363" name="Slide Number Placeholder 3">
-            <a:extLst>
-              <a:ext uri="{FF2B5EF4-FFF2-40B4-BE49-F238E27FC236}">
-                <a16:creationId xmlns:a16="http://schemas.microsoft.com/office/drawing/2014/main" id="{55D84EBE-7204-2B8C-F16D-4C92961131DB}"/>
-              </a:ext>
-            </a:extLst>
-          </p:cNvPr>
-          <p:cNvSpPr>
-            <a:spLocks noGrp="1"/>
-          </p:cNvSpPr>
-          <p:nvPr>
-            <p:ph type="sldNum" sz="quarter" idx="5"/>
-          </p:nvPr>
-        </p:nvSpPr>
-        <p:spPr bwMode="auto">
-          <a:noFill/>
-          <a:extLst>
-            <a:ext uri="{909E8E84-426E-40DD-AFC4-6F175D3DCCD1}">
-              <a14:hiddenFill xmlns:a14="http://schemas.microsoft.com/office/drawing/2010/main">
-                <a:solidFill>
-                  <a:srgbClr val="FFFFFF"/>
-                </a:solidFill>
-              </a14:hiddenFill>
-            </a:ext>
-            <a:ext uri="{91240B29-F687-4F45-9708-019B960494DF}">
-              <a14:hiddenLine xmlns:a14="http://schemas.microsoft.com/office/drawing/2010/main" w="9525">
-                <a:solidFill>
-                  <a:srgbClr val="000000"/>
-                </a:solidFill>
-                <a:miter lim="800000"/>
-                <a:headEnd/>
-                <a:tailEnd/>
-              </a14:hiddenLine>
-            </a:ext>
-          </a:extLst>
-        </p:spPr>
-        <p:txBody>
-          <a:bodyPr/>
-          <a:lstStyle>
-            <a:lvl1pPr eaLnBrk="0" hangingPunct="0">
-              <a:defRPr sz="3200">
-                <a:solidFill>
-                  <a:schemeClr val="tx1"/>
-                </a:solidFill>
-                <a:latin typeface="Helvetica" panose="020B0604020202020204" pitchFamily="34" charset="0"/>
-                <a:ea typeface="MS PGothic" panose="020B0600070205080204" pitchFamily="34" charset="-128"/>
-              </a:defRPr>
-            </a:lvl1pPr>
-            <a:lvl2pPr marL="742950" indent="-285750" eaLnBrk="0" hangingPunct="0">
-              <a:defRPr sz="3200">
-                <a:solidFill>
-                  <a:schemeClr val="tx1"/>
-                </a:solidFill>
-                <a:latin typeface="Helvetica" panose="020B0604020202020204" pitchFamily="34" charset="0"/>
-                <a:ea typeface="MS PGothic" panose="020B0600070205080204" pitchFamily="34" charset="-128"/>
-              </a:defRPr>
-            </a:lvl2pPr>
-            <a:lvl3pPr marL="1143000" indent="-228600" eaLnBrk="0" hangingPunct="0">
-              <a:defRPr sz="3200">
-                <a:solidFill>
-                  <a:schemeClr val="tx1"/>
-                </a:solidFill>
-                <a:latin typeface="Helvetica" panose="020B0604020202020204" pitchFamily="34" charset="0"/>
-                <a:ea typeface="MS PGothic" panose="020B0600070205080204" pitchFamily="34" charset="-128"/>
-              </a:defRPr>
-            </a:lvl3pPr>
-            <a:lvl4pPr marL="1600200" indent="-228600" eaLnBrk="0" hangingPunct="0">
-              <a:defRPr sz="3200">
-                <a:solidFill>
-                  <a:schemeClr val="tx1"/>
-                </a:solidFill>
-                <a:latin typeface="Helvetica" panose="020B0604020202020204" pitchFamily="34" charset="0"/>
-                <a:ea typeface="MS PGothic" panose="020B0600070205080204" pitchFamily="34" charset="-128"/>
-              </a:defRPr>
-            </a:lvl4pPr>
-            <a:lvl5pPr marL="2057400" indent="-228600" eaLnBrk="0" hangingPunct="0">
-              <a:defRPr sz="3200">
-                <a:solidFill>
-                  <a:schemeClr val="tx1"/>
-                </a:solidFill>
-                <a:latin typeface="Helvetica" panose="020B0604020202020204" pitchFamily="34" charset="0"/>
-                <a:ea typeface="MS PGothic" panose="020B0600070205080204" pitchFamily="34" charset="-128"/>
-              </a:defRPr>
-            </a:lvl5pPr>
-            <a:lvl6pPr marL="2514600" indent="-228600" eaLnBrk="0" fontAlgn="base" hangingPunct="0">
-              <a:spcBef>
-                <a:spcPct val="0"/>
-              </a:spcBef>
-              <a:spcAft>
-                <a:spcPct val="0"/>
-              </a:spcAft>
-              <a:defRPr sz="3200">
-                <a:solidFill>
-                  <a:schemeClr val="tx1"/>
-                </a:solidFill>
-                <a:latin typeface="Helvetica" panose="020B0604020202020204" pitchFamily="34" charset="0"/>
-                <a:ea typeface="MS PGothic" panose="020B0600070205080204" pitchFamily="34" charset="-128"/>
-              </a:defRPr>
-            </a:lvl6pPr>
-            <a:lvl7pPr marL="2971800" indent="-228600" eaLnBrk="0" fontAlgn="base" hangingPunct="0">
-              <a:spcBef>
-                <a:spcPct val="0"/>
-              </a:spcBef>
-              <a:spcAft>
-                <a:spcPct val="0"/>
-              </a:spcAft>
-              <a:defRPr sz="3200">
-                <a:solidFill>
-                  <a:schemeClr val="tx1"/>
-                </a:solidFill>
-                <a:latin typeface="Helvetica" panose="020B0604020202020204" pitchFamily="34" charset="0"/>
-                <a:ea typeface="MS PGothic" panose="020B0600070205080204" pitchFamily="34" charset="-128"/>
-              </a:defRPr>
-            </a:lvl7pPr>
-            <a:lvl8pPr marL="3429000" indent="-228600" eaLnBrk="0" fontAlgn="base" hangingPunct="0">
-              <a:spcBef>
-                <a:spcPct val="0"/>
-              </a:spcBef>
-              <a:spcAft>
-                <a:spcPct val="0"/>
-              </a:spcAft>
-              <a:defRPr sz="3200">
-                <a:solidFill>
-                  <a:schemeClr val="tx1"/>
-                </a:solidFill>
-                <a:latin typeface="Helvetica" panose="020B0604020202020204" pitchFamily="34" charset="0"/>
-                <a:ea typeface="MS PGothic" panose="020B0600070205080204" pitchFamily="34" charset="-128"/>
-              </a:defRPr>
-            </a:lvl8pPr>
-            <a:lvl9pPr marL="3886200" indent="-228600" eaLnBrk="0" fontAlgn="base" hangingPunct="0">
-              <a:spcBef>
-                <a:spcPct val="0"/>
-              </a:spcBef>
-              <a:spcAft>
-                <a:spcPct val="0"/>
-              </a:spcAft>
-              <a:defRPr sz="3200">
-                <a:solidFill>
-                  <a:schemeClr val="tx1"/>
-                </a:solidFill>
-                <a:latin typeface="Helvetica" panose="020B0604020202020204" pitchFamily="34" charset="0"/>
-                <a:ea typeface="MS PGothic" panose="020B0600070205080204" pitchFamily="34" charset="-128"/>
-              </a:defRPr>
-            </a:lvl9pPr>
-          </a:lstStyle>
-          <a:p>
-            <a:pPr eaLnBrk="1" hangingPunct="1"/>
-            <a:fld id="{D2F192C3-E46A-4C3F-82E4-B38CCED5FFF1}" type="slidenum">
-              <a:rPr lang="en-US" altLang="en-US" sz="1200">
-                <a:latin typeface="Calibri" panose="020F0502020204030204" pitchFamily="34" charset="0"/>
-              </a:rPr>
-              <a:pPr eaLnBrk="1" hangingPunct="1"/>
-              <a:t>1</a:t>
-            </a:fld>
-            <a:endParaRPr lang="en-US" altLang="en-US" sz="1200">
-              <a:latin typeface="Calibri" panose="020F0502020204030204" pitchFamily="34" charset="0"/>
-            </a:endParaRPr>
-          </a:p>
-        </p:txBody>
-      </p:sp>
-    </p:spTree>
-    <p:extLst>
-      <p:ext uri="{BB962C8B-B14F-4D97-AF65-F5344CB8AC3E}">
-        <p14:creationId xmlns:p14="http://schemas.microsoft.com/office/powerpoint/2010/main" val="1230698047"/>
-      </p:ext>
-    </p:extLst>
-  </p:cSld>
-  <p:clrMapOvr>
-    <a:masterClrMapping/>
-  </p:clrMapOvr>
-</p:notes>
-</file>
-
-<file path=ppt/notesSlides/notesSlide2.xml><?xml version="1.0" encoding="utf-8"?>
-<p:notes xmlns:a="http://schemas.openxmlformats.org/drawingml/2006/main" xmlns:r="http://schemas.openxmlformats.org/officeDocument/2006/relationships" xmlns:p="http://schemas.openxmlformats.org/presentationml/2006/main">
-  <p:cSld>
-    <p:spTree>
-      <p:nvGrpSpPr>
-        <p:cNvPr id="1" name="">
-          <a:extLst>
-            <a:ext uri="{FF2B5EF4-FFF2-40B4-BE49-F238E27FC236}">
               <a16:creationId xmlns:a16="http://schemas.microsoft.com/office/drawing/2014/main" id="{AC92AEC7-EBC3-78EF-76BD-F3E3353ADC0A}"/>
             </a:ext>
           </a:extLst>
@@ -1124,7 +833,7 @@
                 <a:spcPct val="0"/>
               </a:spcBef>
             </a:pPr>
-            <a:endParaRPr lang="en-US" altLang="en-US" sz="9600">
+            <a:endParaRPr lang="en-US" altLang="en-US" sz="9600" dirty="0">
               <a:solidFill>
                 <a:srgbClr val="000000"/>
               </a:solidFill>
@@ -1286,7 +995,7 @@
                 <a:latin typeface="Calibri" panose="020F0502020204030204" pitchFamily="34" charset="0"/>
               </a:rPr>
               <a:pPr eaLnBrk="1" hangingPunct="1"/>
-              <a:t>2</a:t>
+              <a:t>1</a:t>
             </a:fld>
             <a:endParaRPr lang="en-US" altLang="en-US" sz="1200">
               <a:latin typeface="Calibri" panose="020F0502020204030204" pitchFamily="34" charset="0"/>
@@ -4846,2109 +4555,6 @@
         <p:cNvPr id="1" name="">
           <a:extLst>
             <a:ext uri="{FF2B5EF4-FFF2-40B4-BE49-F238E27FC236}">
-              <a16:creationId xmlns:a16="http://schemas.microsoft.com/office/drawing/2014/main" id="{8C88995E-558A-8074-CE8A-4FBAFCCB95F3}"/>
-            </a:ext>
-          </a:extLst>
-        </p:cNvPr>
-        <p:cNvGrpSpPr/>
-        <p:nvPr/>
-      </p:nvGrpSpPr>
-      <p:grpSpPr>
-        <a:xfrm>
-          <a:off x="0" y="0"/>
-          <a:ext cx="0" cy="0"/>
-          <a:chOff x="0" y="0"/>
-          <a:chExt cx="0" cy="0"/>
-        </a:xfrm>
-      </p:grpSpPr>
-      <p:pic>
-        <p:nvPicPr>
-          <p:cNvPr id="3076" name="Picture 4">
-            <a:extLst>
-              <a:ext uri="{FF2B5EF4-FFF2-40B4-BE49-F238E27FC236}">
-                <a16:creationId xmlns:a16="http://schemas.microsoft.com/office/drawing/2014/main" id="{1ADC2776-E32A-5723-D8FA-78200EAA0FFF}"/>
-              </a:ext>
-            </a:extLst>
-          </p:cNvPr>
-          <p:cNvPicPr>
-            <a:picLocks noChangeAspect="1" noChangeArrowheads="1"/>
-          </p:cNvPicPr>
-          <p:nvPr/>
-        </p:nvPicPr>
-        <p:blipFill>
-          <a:blip r:embed="rId4">
-            <a:extLst>
-              <a:ext uri="{28A0092B-C50C-407E-A947-70E740481C1C}">
-                <a14:useLocalDpi xmlns:a14="http://schemas.microsoft.com/office/drawing/2010/main" val="0"/>
-              </a:ext>
-            </a:extLst>
-          </a:blip>
-          <a:srcRect/>
-          <a:stretch>
-            <a:fillRect/>
-          </a:stretch>
-        </p:blipFill>
-        <p:spPr bwMode="auto">
-          <a:xfrm>
-            <a:off x="-1" y="-15766"/>
-            <a:ext cx="51206401" cy="32028013"/>
-          </a:xfrm>
-          <a:prstGeom prst="rect">
-            <a:avLst/>
-          </a:prstGeom>
-          <a:noFill/>
-          <a:extLst>
-            <a:ext uri="{909E8E84-426E-40DD-AFC4-6F175D3DCCD1}">
-              <a14:hiddenFill xmlns:a14="http://schemas.microsoft.com/office/drawing/2010/main">
-                <a:solidFill>
-                  <a:srgbClr val="FFFFFF"/>
-                </a:solidFill>
-              </a14:hiddenFill>
-            </a:ext>
-          </a:extLst>
-        </p:spPr>
-      </p:pic>
-      <p:sp>
-        <p:nvSpPr>
-          <p:cNvPr id="14339" name="Text Box 7">
-            <a:extLst>
-              <a:ext uri="{FF2B5EF4-FFF2-40B4-BE49-F238E27FC236}">
-                <a16:creationId xmlns:a16="http://schemas.microsoft.com/office/drawing/2014/main" id="{0A748180-70C4-65AA-E340-600EBBB40B09}"/>
-              </a:ext>
-            </a:extLst>
-          </p:cNvPr>
-          <p:cNvSpPr txBox="1">
-            <a:spLocks noChangeArrowheads="1"/>
-          </p:cNvSpPr>
-          <p:nvPr/>
-        </p:nvSpPr>
-        <p:spPr bwMode="auto">
-          <a:xfrm>
-            <a:off x="1763486" y="6929437"/>
-            <a:ext cx="10744427" cy="11300277"/>
-          </a:xfrm>
-          <a:prstGeom prst="rect">
-            <a:avLst/>
-          </a:prstGeom>
-          <a:solidFill>
-            <a:schemeClr val="bg1"/>
-          </a:solidFill>
-          <a:ln w="38100">
-            <a:solidFill>
-              <a:srgbClr val="000000"/>
-            </a:solidFill>
-            <a:round/>
-            <a:headEnd/>
-            <a:tailEnd/>
-          </a:ln>
-        </p:spPr>
-        <p:txBody>
-          <a:bodyPr lIns="914400" tIns="457200" rIns="914400" bIns="914400"/>
-          <a:lstStyle>
-            <a:lvl1pPr eaLnBrk="0" hangingPunct="0">
-              <a:tabLst>
-                <a:tab pos="500063" algn="l"/>
-              </a:tabLst>
-              <a:defRPr sz="3200">
-                <a:solidFill>
-                  <a:schemeClr val="tx1"/>
-                </a:solidFill>
-                <a:latin typeface="Helvetica" panose="020B0604020202020204" pitchFamily="34" charset="0"/>
-                <a:ea typeface="MS PGothic" panose="020B0600070205080204" pitchFamily="34" charset="-128"/>
-              </a:defRPr>
-            </a:lvl1pPr>
-            <a:lvl2pPr marL="742950" indent="-285750" eaLnBrk="0" hangingPunct="0">
-              <a:tabLst>
-                <a:tab pos="500063" algn="l"/>
-              </a:tabLst>
-              <a:defRPr sz="3200">
-                <a:solidFill>
-                  <a:schemeClr val="tx1"/>
-                </a:solidFill>
-                <a:latin typeface="Helvetica" panose="020B0604020202020204" pitchFamily="34" charset="0"/>
-                <a:ea typeface="MS PGothic" panose="020B0600070205080204" pitchFamily="34" charset="-128"/>
-              </a:defRPr>
-            </a:lvl2pPr>
-            <a:lvl3pPr marL="1143000" indent="-228600" eaLnBrk="0" hangingPunct="0">
-              <a:tabLst>
-                <a:tab pos="500063" algn="l"/>
-              </a:tabLst>
-              <a:defRPr sz="3200">
-                <a:solidFill>
-                  <a:schemeClr val="tx1"/>
-                </a:solidFill>
-                <a:latin typeface="Helvetica" panose="020B0604020202020204" pitchFamily="34" charset="0"/>
-                <a:ea typeface="MS PGothic" panose="020B0600070205080204" pitchFamily="34" charset="-128"/>
-              </a:defRPr>
-            </a:lvl3pPr>
-            <a:lvl4pPr marL="1600200" indent="-228600" eaLnBrk="0" hangingPunct="0">
-              <a:tabLst>
-                <a:tab pos="500063" algn="l"/>
-              </a:tabLst>
-              <a:defRPr sz="3200">
-                <a:solidFill>
-                  <a:schemeClr val="tx1"/>
-                </a:solidFill>
-                <a:latin typeface="Helvetica" panose="020B0604020202020204" pitchFamily="34" charset="0"/>
-                <a:ea typeface="MS PGothic" panose="020B0600070205080204" pitchFamily="34" charset="-128"/>
-              </a:defRPr>
-            </a:lvl4pPr>
-            <a:lvl5pPr marL="2057400" indent="-228600" eaLnBrk="0" hangingPunct="0">
-              <a:tabLst>
-                <a:tab pos="500063" algn="l"/>
-              </a:tabLst>
-              <a:defRPr sz="3200">
-                <a:solidFill>
-                  <a:schemeClr val="tx1"/>
-                </a:solidFill>
-                <a:latin typeface="Helvetica" panose="020B0604020202020204" pitchFamily="34" charset="0"/>
-                <a:ea typeface="MS PGothic" panose="020B0600070205080204" pitchFamily="34" charset="-128"/>
-              </a:defRPr>
-            </a:lvl5pPr>
-            <a:lvl6pPr marL="2514600" indent="-228600" eaLnBrk="0" fontAlgn="base" hangingPunct="0">
-              <a:spcBef>
-                <a:spcPct val="0"/>
-              </a:spcBef>
-              <a:spcAft>
-                <a:spcPct val="0"/>
-              </a:spcAft>
-              <a:tabLst>
-                <a:tab pos="500063" algn="l"/>
-              </a:tabLst>
-              <a:defRPr sz="3200">
-                <a:solidFill>
-                  <a:schemeClr val="tx1"/>
-                </a:solidFill>
-                <a:latin typeface="Helvetica" panose="020B0604020202020204" pitchFamily="34" charset="0"/>
-                <a:ea typeface="MS PGothic" panose="020B0600070205080204" pitchFamily="34" charset="-128"/>
-              </a:defRPr>
-            </a:lvl6pPr>
-            <a:lvl7pPr marL="2971800" indent="-228600" eaLnBrk="0" fontAlgn="base" hangingPunct="0">
-              <a:spcBef>
-                <a:spcPct val="0"/>
-              </a:spcBef>
-              <a:spcAft>
-                <a:spcPct val="0"/>
-              </a:spcAft>
-              <a:tabLst>
-                <a:tab pos="500063" algn="l"/>
-              </a:tabLst>
-              <a:defRPr sz="3200">
-                <a:solidFill>
-                  <a:schemeClr val="tx1"/>
-                </a:solidFill>
-                <a:latin typeface="Helvetica" panose="020B0604020202020204" pitchFamily="34" charset="0"/>
-                <a:ea typeface="MS PGothic" panose="020B0600070205080204" pitchFamily="34" charset="-128"/>
-              </a:defRPr>
-            </a:lvl7pPr>
-            <a:lvl8pPr marL="3429000" indent="-228600" eaLnBrk="0" fontAlgn="base" hangingPunct="0">
-              <a:spcBef>
-                <a:spcPct val="0"/>
-              </a:spcBef>
-              <a:spcAft>
-                <a:spcPct val="0"/>
-              </a:spcAft>
-              <a:tabLst>
-                <a:tab pos="500063" algn="l"/>
-              </a:tabLst>
-              <a:defRPr sz="3200">
-                <a:solidFill>
-                  <a:schemeClr val="tx1"/>
-                </a:solidFill>
-                <a:latin typeface="Helvetica" panose="020B0604020202020204" pitchFamily="34" charset="0"/>
-                <a:ea typeface="MS PGothic" panose="020B0600070205080204" pitchFamily="34" charset="-128"/>
-              </a:defRPr>
-            </a:lvl8pPr>
-            <a:lvl9pPr marL="3886200" indent="-228600" eaLnBrk="0" fontAlgn="base" hangingPunct="0">
-              <a:spcBef>
-                <a:spcPct val="0"/>
-              </a:spcBef>
-              <a:spcAft>
-                <a:spcPct val="0"/>
-              </a:spcAft>
-              <a:tabLst>
-                <a:tab pos="500063" algn="l"/>
-              </a:tabLst>
-              <a:defRPr sz="3200">
-                <a:solidFill>
-                  <a:schemeClr val="tx1"/>
-                </a:solidFill>
-                <a:latin typeface="Helvetica" panose="020B0604020202020204" pitchFamily="34" charset="0"/>
-                <a:ea typeface="MS PGothic" panose="020B0600070205080204" pitchFamily="34" charset="-128"/>
-              </a:defRPr>
-            </a:lvl9pPr>
-          </a:lstStyle>
-          <a:p>
-            <a:pPr algn="just" eaLnBrk="1" hangingPunct="1">
-              <a:spcBef>
-                <a:spcPct val="50000"/>
-              </a:spcBef>
-            </a:pPr>
-            <a:r>
-              <a:rPr lang="en-US" altLang="en-US" sz="4800" b="1" dirty="0">
-                <a:latin typeface="Avenir Heavy" pitchFamily="124" charset="0"/>
-              </a:rPr>
-              <a:t>Introduction</a:t>
-            </a:r>
-          </a:p>
-          <a:p>
-            <a:pPr eaLnBrk="1" hangingPunct="1">
-              <a:spcBef>
-                <a:spcPct val="10000"/>
-              </a:spcBef>
-            </a:pPr>
-            <a:endParaRPr lang="en-US" altLang="ja-JP" sz="4800" dirty="0">
-              <a:latin typeface="Avenir Book" pitchFamily="124" charset="0"/>
-            </a:endParaRPr>
-          </a:p>
-          <a:p>
-            <a:pPr eaLnBrk="1" hangingPunct="1">
-              <a:spcBef>
-                <a:spcPct val="10000"/>
-              </a:spcBef>
-            </a:pPr>
-            <a:r>
-              <a:rPr lang="en-US" sz="4000" dirty="0">
-                <a:latin typeface="Avenir Book"/>
-              </a:rPr>
-              <a:t>This project explores how accurately NBA regular season data can predict playoff outcomes using neural networks trained on game-by-game statistics. The goal is to identify patterns in predictive accuracy as the season progresses, uncovering whether certain segments of games better indicate postseason success. By addressing doubts about the regular season’s value, this study offers potential insights to enhance sports analytics, inform league policies, and showcase the dynamic applications of machine learning in real-world scenarios.</a:t>
-            </a:r>
-            <a:endParaRPr lang="en-US" altLang="en-US" sz="4000" dirty="0">
-              <a:latin typeface="Avenir Book"/>
-            </a:endParaRPr>
-          </a:p>
-        </p:txBody>
-      </p:sp>
-      <p:sp>
-        <p:nvSpPr>
-          <p:cNvPr id="14340" name="Text Box 11">
-            <a:extLst>
-              <a:ext uri="{FF2B5EF4-FFF2-40B4-BE49-F238E27FC236}">
-                <a16:creationId xmlns:a16="http://schemas.microsoft.com/office/drawing/2014/main" id="{15C1BDC7-7587-FB19-C59C-76EA155BF4C7}"/>
-              </a:ext>
-            </a:extLst>
-          </p:cNvPr>
-          <p:cNvSpPr txBox="1">
-            <a:spLocks noChangeArrowheads="1"/>
-          </p:cNvSpPr>
-          <p:nvPr/>
-        </p:nvSpPr>
-        <p:spPr bwMode="auto">
-          <a:xfrm>
-            <a:off x="1763486" y="19333028"/>
-            <a:ext cx="10744427" cy="10254343"/>
-          </a:xfrm>
-          <a:prstGeom prst="rect">
-            <a:avLst/>
-          </a:prstGeom>
-          <a:solidFill>
-            <a:schemeClr val="bg1"/>
-          </a:solidFill>
-          <a:ln w="38100">
-            <a:solidFill>
-              <a:srgbClr val="000000"/>
-            </a:solidFill>
-            <a:round/>
-            <a:headEnd/>
-            <a:tailEnd/>
-          </a:ln>
-        </p:spPr>
-        <p:txBody>
-          <a:bodyPr lIns="914400" tIns="457200" rIns="914400" bIns="914400"/>
-          <a:lstStyle>
-            <a:lvl1pPr eaLnBrk="0" hangingPunct="0">
-              <a:tabLst>
-                <a:tab pos="508000" algn="l"/>
-              </a:tabLst>
-              <a:defRPr sz="3200">
-                <a:solidFill>
-                  <a:schemeClr val="tx1"/>
-                </a:solidFill>
-                <a:latin typeface="Helvetica" panose="020B0604020202020204" pitchFamily="34" charset="0"/>
-                <a:ea typeface="MS PGothic" panose="020B0600070205080204" pitchFamily="34" charset="-128"/>
-              </a:defRPr>
-            </a:lvl1pPr>
-            <a:lvl2pPr marL="742950" indent="-285750" eaLnBrk="0" hangingPunct="0">
-              <a:tabLst>
-                <a:tab pos="508000" algn="l"/>
-              </a:tabLst>
-              <a:defRPr sz="3200">
-                <a:solidFill>
-                  <a:schemeClr val="tx1"/>
-                </a:solidFill>
-                <a:latin typeface="Helvetica" panose="020B0604020202020204" pitchFamily="34" charset="0"/>
-                <a:ea typeface="MS PGothic" panose="020B0600070205080204" pitchFamily="34" charset="-128"/>
-              </a:defRPr>
-            </a:lvl2pPr>
-            <a:lvl3pPr marL="1143000" indent="-228600" eaLnBrk="0" hangingPunct="0">
-              <a:tabLst>
-                <a:tab pos="508000" algn="l"/>
-              </a:tabLst>
-              <a:defRPr sz="3200">
-                <a:solidFill>
-                  <a:schemeClr val="tx1"/>
-                </a:solidFill>
-                <a:latin typeface="Helvetica" panose="020B0604020202020204" pitchFamily="34" charset="0"/>
-                <a:ea typeface="MS PGothic" panose="020B0600070205080204" pitchFamily="34" charset="-128"/>
-              </a:defRPr>
-            </a:lvl3pPr>
-            <a:lvl4pPr marL="1600200" indent="-228600" eaLnBrk="0" hangingPunct="0">
-              <a:tabLst>
-                <a:tab pos="508000" algn="l"/>
-              </a:tabLst>
-              <a:defRPr sz="3200">
-                <a:solidFill>
-                  <a:schemeClr val="tx1"/>
-                </a:solidFill>
-                <a:latin typeface="Helvetica" panose="020B0604020202020204" pitchFamily="34" charset="0"/>
-                <a:ea typeface="MS PGothic" panose="020B0600070205080204" pitchFamily="34" charset="-128"/>
-              </a:defRPr>
-            </a:lvl4pPr>
-            <a:lvl5pPr marL="2057400" indent="-228600" eaLnBrk="0" hangingPunct="0">
-              <a:tabLst>
-                <a:tab pos="508000" algn="l"/>
-              </a:tabLst>
-              <a:defRPr sz="3200">
-                <a:solidFill>
-                  <a:schemeClr val="tx1"/>
-                </a:solidFill>
-                <a:latin typeface="Helvetica" panose="020B0604020202020204" pitchFamily="34" charset="0"/>
-                <a:ea typeface="MS PGothic" panose="020B0600070205080204" pitchFamily="34" charset="-128"/>
-              </a:defRPr>
-            </a:lvl5pPr>
-            <a:lvl6pPr marL="2514600" indent="-228600" eaLnBrk="0" fontAlgn="base" hangingPunct="0">
-              <a:spcBef>
-                <a:spcPct val="0"/>
-              </a:spcBef>
-              <a:spcAft>
-                <a:spcPct val="0"/>
-              </a:spcAft>
-              <a:tabLst>
-                <a:tab pos="508000" algn="l"/>
-              </a:tabLst>
-              <a:defRPr sz="3200">
-                <a:solidFill>
-                  <a:schemeClr val="tx1"/>
-                </a:solidFill>
-                <a:latin typeface="Helvetica" panose="020B0604020202020204" pitchFamily="34" charset="0"/>
-                <a:ea typeface="MS PGothic" panose="020B0600070205080204" pitchFamily="34" charset="-128"/>
-              </a:defRPr>
-            </a:lvl6pPr>
-            <a:lvl7pPr marL="2971800" indent="-228600" eaLnBrk="0" fontAlgn="base" hangingPunct="0">
-              <a:spcBef>
-                <a:spcPct val="0"/>
-              </a:spcBef>
-              <a:spcAft>
-                <a:spcPct val="0"/>
-              </a:spcAft>
-              <a:tabLst>
-                <a:tab pos="508000" algn="l"/>
-              </a:tabLst>
-              <a:defRPr sz="3200">
-                <a:solidFill>
-                  <a:schemeClr val="tx1"/>
-                </a:solidFill>
-                <a:latin typeface="Helvetica" panose="020B0604020202020204" pitchFamily="34" charset="0"/>
-                <a:ea typeface="MS PGothic" panose="020B0600070205080204" pitchFamily="34" charset="-128"/>
-              </a:defRPr>
-            </a:lvl7pPr>
-            <a:lvl8pPr marL="3429000" indent="-228600" eaLnBrk="0" fontAlgn="base" hangingPunct="0">
-              <a:spcBef>
-                <a:spcPct val="0"/>
-              </a:spcBef>
-              <a:spcAft>
-                <a:spcPct val="0"/>
-              </a:spcAft>
-              <a:tabLst>
-                <a:tab pos="508000" algn="l"/>
-              </a:tabLst>
-              <a:defRPr sz="3200">
-                <a:solidFill>
-                  <a:schemeClr val="tx1"/>
-                </a:solidFill>
-                <a:latin typeface="Helvetica" panose="020B0604020202020204" pitchFamily="34" charset="0"/>
-                <a:ea typeface="MS PGothic" panose="020B0600070205080204" pitchFamily="34" charset="-128"/>
-              </a:defRPr>
-            </a:lvl8pPr>
-            <a:lvl9pPr marL="3886200" indent="-228600" eaLnBrk="0" fontAlgn="base" hangingPunct="0">
-              <a:spcBef>
-                <a:spcPct val="0"/>
-              </a:spcBef>
-              <a:spcAft>
-                <a:spcPct val="0"/>
-              </a:spcAft>
-              <a:tabLst>
-                <a:tab pos="508000" algn="l"/>
-              </a:tabLst>
-              <a:defRPr sz="3200">
-                <a:solidFill>
-                  <a:schemeClr val="tx1"/>
-                </a:solidFill>
-                <a:latin typeface="Helvetica" panose="020B0604020202020204" pitchFamily="34" charset="0"/>
-                <a:ea typeface="MS PGothic" panose="020B0600070205080204" pitchFamily="34" charset="-128"/>
-              </a:defRPr>
-            </a:lvl9pPr>
-          </a:lstStyle>
-          <a:p>
-            <a:pPr algn="just" eaLnBrk="1" hangingPunct="1">
-              <a:spcBef>
-                <a:spcPct val="50000"/>
-              </a:spcBef>
-            </a:pPr>
-            <a:r>
-              <a:rPr lang="en-US" altLang="en-US" sz="4800" b="1" dirty="0">
-                <a:solidFill>
-                  <a:srgbClr val="000000"/>
-                </a:solidFill>
-                <a:latin typeface="Avenir Heavy" pitchFamily="124" charset="0"/>
-              </a:rPr>
-              <a:t>Data Processing</a:t>
-            </a:r>
-            <a:endParaRPr lang="en-US" altLang="en-US" sz="4800" dirty="0">
-              <a:latin typeface="Avenir Book" pitchFamily="124" charset="0"/>
-            </a:endParaRPr>
-          </a:p>
-          <a:p>
-            <a:pPr eaLnBrk="1" hangingPunct="1">
-              <a:spcBef>
-                <a:spcPct val="10000"/>
-              </a:spcBef>
-            </a:pPr>
-            <a:endParaRPr lang="en-US" altLang="en-US" sz="4800" dirty="0">
-              <a:latin typeface="Avenir Book" pitchFamily="124" charset="0"/>
-            </a:endParaRPr>
-          </a:p>
-          <a:p>
-            <a:pPr eaLnBrk="1" hangingPunct="1">
-              <a:spcBef>
-                <a:spcPct val="10000"/>
-              </a:spcBef>
-            </a:pPr>
-            <a:r>
-              <a:rPr lang="en-US" altLang="en-US" sz="4800" dirty="0">
-                <a:latin typeface="Avenir Book" pitchFamily="124" charset="0"/>
-              </a:rPr>
-              <a:t>Four sentences max. </a:t>
-            </a:r>
-          </a:p>
-          <a:p>
-            <a:pPr eaLnBrk="1" hangingPunct="1">
-              <a:spcBef>
-                <a:spcPct val="10000"/>
-              </a:spcBef>
-            </a:pPr>
-            <a:endParaRPr lang="en-US" altLang="en-US" sz="4800" dirty="0">
-              <a:latin typeface="Avenir Book" pitchFamily="124" charset="0"/>
-            </a:endParaRPr>
-          </a:p>
-          <a:p>
-            <a:pPr eaLnBrk="1" hangingPunct="1">
-              <a:spcBef>
-                <a:spcPct val="10000"/>
-              </a:spcBef>
-            </a:pPr>
-            <a:r>
-              <a:rPr lang="en-US" altLang="en-US" sz="4800" dirty="0">
-                <a:latin typeface="Avenir Book" pitchFamily="124" charset="0"/>
-              </a:rPr>
-              <a:t>If viewer truly wants to know gruesome details, they’ll ask or email you. </a:t>
-            </a:r>
-          </a:p>
-          <a:p>
-            <a:pPr eaLnBrk="1" hangingPunct="1">
-              <a:spcBef>
-                <a:spcPct val="10000"/>
-              </a:spcBef>
-            </a:pPr>
-            <a:endParaRPr lang="en-US" altLang="en-US" sz="4800" dirty="0">
-              <a:latin typeface="Avenir Book" pitchFamily="124" charset="0"/>
-            </a:endParaRPr>
-          </a:p>
-          <a:p>
-            <a:pPr eaLnBrk="1" hangingPunct="1">
-              <a:spcBef>
-                <a:spcPct val="10000"/>
-              </a:spcBef>
-            </a:pPr>
-            <a:r>
-              <a:rPr lang="en-US" altLang="en-US" sz="4800" dirty="0">
-                <a:latin typeface="Avenir Book" pitchFamily="124" charset="0"/>
-              </a:rPr>
-              <a:t>Sometimes adding a pic is good. </a:t>
-            </a:r>
-          </a:p>
-          <a:p>
-            <a:pPr eaLnBrk="1" hangingPunct="1">
-              <a:spcBef>
-                <a:spcPct val="10000"/>
-              </a:spcBef>
-            </a:pPr>
-            <a:endParaRPr lang="en-US" altLang="en-US" sz="4800" dirty="0">
-              <a:latin typeface="Avenir Book" pitchFamily="124" charset="0"/>
-            </a:endParaRPr>
-          </a:p>
-        </p:txBody>
-      </p:sp>
-      <p:sp>
-        <p:nvSpPr>
-          <p:cNvPr id="14341" name="Text Box 12">
-            <a:extLst>
-              <a:ext uri="{FF2B5EF4-FFF2-40B4-BE49-F238E27FC236}">
-                <a16:creationId xmlns:a16="http://schemas.microsoft.com/office/drawing/2014/main" id="{1C4C186A-44F2-BD7C-0303-A600CC4471D7}"/>
-              </a:ext>
-            </a:extLst>
-          </p:cNvPr>
-          <p:cNvSpPr txBox="1">
-            <a:spLocks noChangeArrowheads="1"/>
-          </p:cNvSpPr>
-          <p:nvPr/>
-        </p:nvSpPr>
-        <p:spPr bwMode="auto">
-          <a:xfrm>
-            <a:off x="13822363" y="6908800"/>
-            <a:ext cx="23347362" cy="22678571"/>
-          </a:xfrm>
-          <a:prstGeom prst="rect">
-            <a:avLst/>
-          </a:prstGeom>
-          <a:solidFill>
-            <a:schemeClr val="bg1"/>
-          </a:solidFill>
-          <a:ln w="38100">
-            <a:solidFill>
-              <a:srgbClr val="000000"/>
-            </a:solidFill>
-            <a:round/>
-            <a:headEnd/>
-            <a:tailEnd/>
-          </a:ln>
-        </p:spPr>
-        <p:txBody>
-          <a:bodyPr lIns="914400" tIns="457200" rIns="914400" bIns="914400"/>
-          <a:lstStyle>
-            <a:lvl1pPr eaLnBrk="0" hangingPunct="0">
-              <a:tabLst>
-                <a:tab pos="500063" algn="l"/>
-              </a:tabLst>
-              <a:defRPr sz="3200">
-                <a:solidFill>
-                  <a:schemeClr val="tx1"/>
-                </a:solidFill>
-                <a:latin typeface="Helvetica" panose="020B0604020202020204" pitchFamily="34" charset="0"/>
-                <a:ea typeface="MS PGothic" panose="020B0600070205080204" pitchFamily="34" charset="-128"/>
-              </a:defRPr>
-            </a:lvl1pPr>
-            <a:lvl2pPr marL="742950" indent="-285750" eaLnBrk="0" hangingPunct="0">
-              <a:tabLst>
-                <a:tab pos="500063" algn="l"/>
-              </a:tabLst>
-              <a:defRPr sz="3200">
-                <a:solidFill>
-                  <a:schemeClr val="tx1"/>
-                </a:solidFill>
-                <a:latin typeface="Helvetica" panose="020B0604020202020204" pitchFamily="34" charset="0"/>
-                <a:ea typeface="MS PGothic" panose="020B0600070205080204" pitchFamily="34" charset="-128"/>
-              </a:defRPr>
-            </a:lvl2pPr>
-            <a:lvl3pPr marL="1143000" indent="-228600" eaLnBrk="0" hangingPunct="0">
-              <a:tabLst>
-                <a:tab pos="500063" algn="l"/>
-              </a:tabLst>
-              <a:defRPr sz="3200">
-                <a:solidFill>
-                  <a:schemeClr val="tx1"/>
-                </a:solidFill>
-                <a:latin typeface="Helvetica" panose="020B0604020202020204" pitchFamily="34" charset="0"/>
-                <a:ea typeface="MS PGothic" panose="020B0600070205080204" pitchFamily="34" charset="-128"/>
-              </a:defRPr>
-            </a:lvl3pPr>
-            <a:lvl4pPr marL="1600200" indent="-228600" eaLnBrk="0" hangingPunct="0">
-              <a:tabLst>
-                <a:tab pos="500063" algn="l"/>
-              </a:tabLst>
-              <a:defRPr sz="3200">
-                <a:solidFill>
-                  <a:schemeClr val="tx1"/>
-                </a:solidFill>
-                <a:latin typeface="Helvetica" panose="020B0604020202020204" pitchFamily="34" charset="0"/>
-                <a:ea typeface="MS PGothic" panose="020B0600070205080204" pitchFamily="34" charset="-128"/>
-              </a:defRPr>
-            </a:lvl4pPr>
-            <a:lvl5pPr marL="2057400" indent="-228600" eaLnBrk="0" hangingPunct="0">
-              <a:tabLst>
-                <a:tab pos="500063" algn="l"/>
-              </a:tabLst>
-              <a:defRPr sz="3200">
-                <a:solidFill>
-                  <a:schemeClr val="tx1"/>
-                </a:solidFill>
-                <a:latin typeface="Helvetica" panose="020B0604020202020204" pitchFamily="34" charset="0"/>
-                <a:ea typeface="MS PGothic" panose="020B0600070205080204" pitchFamily="34" charset="-128"/>
-              </a:defRPr>
-            </a:lvl5pPr>
-            <a:lvl6pPr marL="2514600" indent="-228600" eaLnBrk="0" fontAlgn="base" hangingPunct="0">
-              <a:spcBef>
-                <a:spcPct val="0"/>
-              </a:spcBef>
-              <a:spcAft>
-                <a:spcPct val="0"/>
-              </a:spcAft>
-              <a:tabLst>
-                <a:tab pos="500063" algn="l"/>
-              </a:tabLst>
-              <a:defRPr sz="3200">
-                <a:solidFill>
-                  <a:schemeClr val="tx1"/>
-                </a:solidFill>
-                <a:latin typeface="Helvetica" panose="020B0604020202020204" pitchFamily="34" charset="0"/>
-                <a:ea typeface="MS PGothic" panose="020B0600070205080204" pitchFamily="34" charset="-128"/>
-              </a:defRPr>
-            </a:lvl6pPr>
-            <a:lvl7pPr marL="2971800" indent="-228600" eaLnBrk="0" fontAlgn="base" hangingPunct="0">
-              <a:spcBef>
-                <a:spcPct val="0"/>
-              </a:spcBef>
-              <a:spcAft>
-                <a:spcPct val="0"/>
-              </a:spcAft>
-              <a:tabLst>
-                <a:tab pos="500063" algn="l"/>
-              </a:tabLst>
-              <a:defRPr sz="3200">
-                <a:solidFill>
-                  <a:schemeClr val="tx1"/>
-                </a:solidFill>
-                <a:latin typeface="Helvetica" panose="020B0604020202020204" pitchFamily="34" charset="0"/>
-                <a:ea typeface="MS PGothic" panose="020B0600070205080204" pitchFamily="34" charset="-128"/>
-              </a:defRPr>
-            </a:lvl7pPr>
-            <a:lvl8pPr marL="3429000" indent="-228600" eaLnBrk="0" fontAlgn="base" hangingPunct="0">
-              <a:spcBef>
-                <a:spcPct val="0"/>
-              </a:spcBef>
-              <a:spcAft>
-                <a:spcPct val="0"/>
-              </a:spcAft>
-              <a:tabLst>
-                <a:tab pos="500063" algn="l"/>
-              </a:tabLst>
-              <a:defRPr sz="3200">
-                <a:solidFill>
-                  <a:schemeClr val="tx1"/>
-                </a:solidFill>
-                <a:latin typeface="Helvetica" panose="020B0604020202020204" pitchFamily="34" charset="0"/>
-                <a:ea typeface="MS PGothic" panose="020B0600070205080204" pitchFamily="34" charset="-128"/>
-              </a:defRPr>
-            </a:lvl8pPr>
-            <a:lvl9pPr marL="3886200" indent="-228600" eaLnBrk="0" fontAlgn="base" hangingPunct="0">
-              <a:spcBef>
-                <a:spcPct val="0"/>
-              </a:spcBef>
-              <a:spcAft>
-                <a:spcPct val="0"/>
-              </a:spcAft>
-              <a:tabLst>
-                <a:tab pos="500063" algn="l"/>
-              </a:tabLst>
-              <a:defRPr sz="3200">
-                <a:solidFill>
-                  <a:schemeClr val="tx1"/>
-                </a:solidFill>
-                <a:latin typeface="Helvetica" panose="020B0604020202020204" pitchFamily="34" charset="0"/>
-                <a:ea typeface="MS PGothic" panose="020B0600070205080204" pitchFamily="34" charset="-128"/>
-              </a:defRPr>
-            </a:lvl9pPr>
-          </a:lstStyle>
-          <a:p>
-            <a:pPr algn="just" eaLnBrk="1" hangingPunct="1"/>
-            <a:r>
-              <a:rPr lang="en-US" altLang="en-US" sz="4800" b="1" dirty="0">
-                <a:solidFill>
-                  <a:srgbClr val="000000"/>
-                </a:solidFill>
-                <a:latin typeface="Avenir Heavy" pitchFamily="124" charset="0"/>
-              </a:rPr>
-              <a:t>Results</a:t>
-            </a:r>
-          </a:p>
-          <a:p>
-            <a:pPr eaLnBrk="1" hangingPunct="1">
-              <a:spcBef>
-                <a:spcPts val="500"/>
-              </a:spcBef>
-            </a:pPr>
-            <a:endParaRPr lang="en-US" altLang="ja-JP" sz="4800" dirty="0">
-              <a:latin typeface="Avenir Book" pitchFamily="124" charset="0"/>
-            </a:endParaRPr>
-          </a:p>
-          <a:p>
-            <a:pPr eaLnBrk="1" hangingPunct="1">
-              <a:spcBef>
-                <a:spcPts val="500"/>
-              </a:spcBef>
-            </a:pPr>
-            <a:r>
-              <a:rPr lang="en-US" altLang="ja-JP" sz="4800" dirty="0">
-                <a:latin typeface="Avenir Book" pitchFamily="124" charset="0"/>
-              </a:rPr>
-              <a:t>Highlight your LARGE photographs, charts, maps, or in this central arena.</a:t>
-            </a:r>
-          </a:p>
-          <a:p>
-            <a:pPr eaLnBrk="1" hangingPunct="1">
-              <a:spcBef>
-                <a:spcPts val="500"/>
-              </a:spcBef>
-            </a:pPr>
-            <a:endParaRPr lang="en-US" altLang="ja-JP" sz="4800" dirty="0">
-              <a:latin typeface="Avenir Book" pitchFamily="124" charset="0"/>
-            </a:endParaRPr>
-          </a:p>
-          <a:p>
-            <a:pPr eaLnBrk="1" hangingPunct="1">
-              <a:spcBef>
-                <a:spcPts val="500"/>
-              </a:spcBef>
-            </a:pPr>
-            <a:r>
-              <a:rPr lang="en-US" altLang="ja-JP" sz="4800" dirty="0">
-                <a:latin typeface="Avenir Book" pitchFamily="124" charset="0"/>
-              </a:rPr>
-              <a:t>Don’t include every graphic you’ve made that relates to project. Choose one. Or two. And separate graphics with plenty of white space. </a:t>
-            </a:r>
-          </a:p>
-          <a:p>
-            <a:pPr eaLnBrk="1" hangingPunct="1">
-              <a:spcBef>
-                <a:spcPts val="500"/>
-              </a:spcBef>
-            </a:pPr>
-            <a:endParaRPr lang="en-US" altLang="ja-JP" sz="4800" dirty="0">
-              <a:latin typeface="Avenir Book" pitchFamily="124" charset="0"/>
-            </a:endParaRPr>
-          </a:p>
-          <a:p>
-            <a:pPr eaLnBrk="1" hangingPunct="1">
-              <a:spcBef>
-                <a:spcPts val="500"/>
-              </a:spcBef>
-            </a:pPr>
-            <a:endParaRPr lang="en-US" altLang="ja-JP" sz="4800" dirty="0">
-              <a:latin typeface="Avenir Book" pitchFamily="124" charset="0"/>
-            </a:endParaRPr>
-          </a:p>
-          <a:p>
-            <a:pPr eaLnBrk="1" hangingPunct="1">
-              <a:spcBef>
-                <a:spcPts val="500"/>
-              </a:spcBef>
-            </a:pPr>
-            <a:endParaRPr lang="en-US" altLang="ja-JP" sz="4800" dirty="0">
-              <a:latin typeface="Avenir Book" pitchFamily="124" charset="0"/>
-            </a:endParaRPr>
-          </a:p>
-          <a:p>
-            <a:pPr eaLnBrk="1" hangingPunct="1">
-              <a:spcBef>
-                <a:spcPts val="500"/>
-              </a:spcBef>
-            </a:pPr>
-            <a:endParaRPr lang="en-US" altLang="ja-JP" sz="4800" dirty="0">
-              <a:latin typeface="Avenir Book" pitchFamily="124" charset="0"/>
-            </a:endParaRPr>
-          </a:p>
-          <a:p>
-            <a:pPr eaLnBrk="1" hangingPunct="1">
-              <a:spcBef>
-                <a:spcPts val="500"/>
-              </a:spcBef>
-            </a:pPr>
-            <a:endParaRPr lang="en-US" altLang="ja-JP" sz="4800" dirty="0">
-              <a:latin typeface="Avenir Book" pitchFamily="124" charset="0"/>
-            </a:endParaRPr>
-          </a:p>
-          <a:p>
-            <a:pPr eaLnBrk="1" hangingPunct="1">
-              <a:spcBef>
-                <a:spcPts val="500"/>
-              </a:spcBef>
-            </a:pPr>
-            <a:endParaRPr lang="en-US" altLang="ja-JP" sz="4800" dirty="0">
-              <a:latin typeface="Avenir Book" pitchFamily="124" charset="0"/>
-            </a:endParaRPr>
-          </a:p>
-          <a:p>
-            <a:pPr eaLnBrk="1" hangingPunct="1">
-              <a:spcBef>
-                <a:spcPts val="500"/>
-              </a:spcBef>
-            </a:pPr>
-            <a:endParaRPr lang="en-US" altLang="ja-JP" sz="4800" dirty="0">
-              <a:latin typeface="Avenir Book" pitchFamily="124" charset="0"/>
-            </a:endParaRPr>
-          </a:p>
-          <a:p>
-            <a:pPr eaLnBrk="1" hangingPunct="1">
-              <a:spcBef>
-                <a:spcPts val="500"/>
-              </a:spcBef>
-            </a:pPr>
-            <a:endParaRPr lang="en-US" altLang="ja-JP" sz="4800" dirty="0">
-              <a:latin typeface="Avenir Book" pitchFamily="124" charset="0"/>
-            </a:endParaRPr>
-          </a:p>
-          <a:p>
-            <a:pPr eaLnBrk="1" hangingPunct="1">
-              <a:spcBef>
-                <a:spcPts val="500"/>
-              </a:spcBef>
-            </a:pPr>
-            <a:endParaRPr lang="en-US" altLang="ja-JP" sz="4800" dirty="0">
-              <a:latin typeface="Avenir Book" pitchFamily="124" charset="0"/>
-            </a:endParaRPr>
-          </a:p>
-          <a:p>
-            <a:pPr eaLnBrk="1" hangingPunct="1">
-              <a:spcBef>
-                <a:spcPts val="500"/>
-              </a:spcBef>
-            </a:pPr>
-            <a:endParaRPr lang="en-US" altLang="ja-JP" sz="4800" dirty="0">
-              <a:latin typeface="Avenir Book" pitchFamily="124" charset="0"/>
-            </a:endParaRPr>
-          </a:p>
-          <a:p>
-            <a:pPr eaLnBrk="1" hangingPunct="1">
-              <a:spcBef>
-                <a:spcPts val="500"/>
-              </a:spcBef>
-            </a:pPr>
-            <a:r>
-              <a:rPr lang="en-US" altLang="ja-JP" sz="4800" dirty="0">
-                <a:latin typeface="Avenir Book" pitchFamily="124" charset="0"/>
-              </a:rPr>
-              <a:t>Annotate graphics with arrows and callout boxes so that viewer is </a:t>
-            </a:r>
-            <a:r>
-              <a:rPr lang="en-US" altLang="ja-JP" sz="4800" b="1" dirty="0">
-                <a:latin typeface="Avenir Heavy" pitchFamily="124" charset="0"/>
-              </a:rPr>
-              <a:t>visually</a:t>
-            </a:r>
-            <a:r>
-              <a:rPr lang="en-US" altLang="ja-JP" sz="4800" b="1" dirty="0">
-                <a:latin typeface="Avenir Book" pitchFamily="124" charset="0"/>
-              </a:rPr>
-              <a:t> led</a:t>
-            </a:r>
-            <a:r>
-              <a:rPr lang="en-US" altLang="ja-JP" sz="4800" dirty="0">
-                <a:latin typeface="Avenir Book" pitchFamily="124" charset="0"/>
-              </a:rPr>
-              <a:t> through how hypothesis is addressed. The goal is to enable viewers to understand the logic behind your conclusions </a:t>
-            </a:r>
-            <a:r>
-              <a:rPr lang="en-US" altLang="ja-JP" sz="4800" i="1" dirty="0">
-                <a:latin typeface="Avenir Book" pitchFamily="124" charset="0"/>
-              </a:rPr>
-              <a:t>without you needing to be there</a:t>
-            </a:r>
-            <a:r>
-              <a:rPr lang="en-US" altLang="ja-JP" sz="4800" dirty="0">
-                <a:latin typeface="Avenir Book" pitchFamily="124" charset="0"/>
-              </a:rPr>
-              <a:t>.</a:t>
-            </a:r>
-          </a:p>
-          <a:p>
-            <a:pPr eaLnBrk="1" hangingPunct="1">
-              <a:spcBef>
-                <a:spcPts val="500"/>
-              </a:spcBef>
-            </a:pPr>
-            <a:endParaRPr lang="en-US" altLang="ja-JP" sz="4800" dirty="0">
-              <a:latin typeface="Avenir Book" pitchFamily="124" charset="0"/>
-            </a:endParaRPr>
-          </a:p>
-          <a:p>
-            <a:pPr eaLnBrk="1" hangingPunct="1">
-              <a:spcBef>
-                <a:spcPts val="500"/>
-              </a:spcBef>
-            </a:pPr>
-            <a:r>
-              <a:rPr lang="en-US" altLang="ja-JP" sz="4800" dirty="0">
-                <a:latin typeface="Avenir Book" pitchFamily="124" charset="0"/>
-              </a:rPr>
-              <a:t>Keep font size of all text (even graph labels) as big or bigger than in rest of poster. </a:t>
-            </a:r>
-          </a:p>
-          <a:p>
-            <a:pPr eaLnBrk="1" hangingPunct="1">
-              <a:spcBef>
-                <a:spcPct val="50000"/>
-              </a:spcBef>
-            </a:pPr>
-            <a:endParaRPr lang="en-US" altLang="en-US" sz="4800" dirty="0">
-              <a:solidFill>
-                <a:schemeClr val="accent2"/>
-              </a:solidFill>
-              <a:latin typeface="Avenir Book" pitchFamily="124" charset="0"/>
-            </a:endParaRPr>
-          </a:p>
-          <a:p>
-            <a:pPr eaLnBrk="1" hangingPunct="1">
-              <a:spcBef>
-                <a:spcPct val="50000"/>
-              </a:spcBef>
-            </a:pPr>
-            <a:endParaRPr lang="en-US" altLang="en-US" sz="2800" i="1" dirty="0">
-              <a:solidFill>
-                <a:schemeClr val="accent2"/>
-              </a:solidFill>
-              <a:latin typeface="Avenir Book" pitchFamily="124" charset="0"/>
-            </a:endParaRPr>
-          </a:p>
-        </p:txBody>
-      </p:sp>
-      <p:sp>
-        <p:nvSpPr>
-          <p:cNvPr id="14342" name="Text Box 13">
-            <a:extLst>
-              <a:ext uri="{FF2B5EF4-FFF2-40B4-BE49-F238E27FC236}">
-                <a16:creationId xmlns:a16="http://schemas.microsoft.com/office/drawing/2014/main" id="{C5BAEFC1-27C5-0A7A-0E2A-EA3B2784CD09}"/>
-              </a:ext>
-            </a:extLst>
-          </p:cNvPr>
-          <p:cNvSpPr txBox="1">
-            <a:spLocks noChangeArrowheads="1"/>
-          </p:cNvSpPr>
-          <p:nvPr/>
-        </p:nvSpPr>
-        <p:spPr bwMode="auto">
-          <a:xfrm>
-            <a:off x="38598475" y="6902450"/>
-            <a:ext cx="10811782" cy="9242425"/>
-          </a:xfrm>
-          <a:prstGeom prst="rect">
-            <a:avLst/>
-          </a:prstGeom>
-          <a:solidFill>
-            <a:schemeClr val="bg1"/>
-          </a:solidFill>
-          <a:ln w="38100">
-            <a:solidFill>
-              <a:srgbClr val="000000"/>
-            </a:solidFill>
-            <a:round/>
-            <a:headEnd/>
-            <a:tailEnd/>
-          </a:ln>
-        </p:spPr>
-        <p:txBody>
-          <a:bodyPr lIns="914400" tIns="457200" rIns="914400" bIns="914400"/>
-          <a:lstStyle>
-            <a:lvl1pPr eaLnBrk="0" hangingPunct="0">
-              <a:tabLst>
-                <a:tab pos="635000" algn="l"/>
-              </a:tabLst>
-              <a:defRPr sz="3200">
-                <a:solidFill>
-                  <a:schemeClr val="tx1"/>
-                </a:solidFill>
-                <a:latin typeface="Helvetica" panose="020B0604020202020204" pitchFamily="34" charset="0"/>
-                <a:ea typeface="MS PGothic" panose="020B0600070205080204" pitchFamily="34" charset="-128"/>
-              </a:defRPr>
-            </a:lvl1pPr>
-            <a:lvl2pPr marL="742950" indent="-285750" eaLnBrk="0" hangingPunct="0">
-              <a:tabLst>
-                <a:tab pos="635000" algn="l"/>
-              </a:tabLst>
-              <a:defRPr sz="3200">
-                <a:solidFill>
-                  <a:schemeClr val="tx1"/>
-                </a:solidFill>
-                <a:latin typeface="Helvetica" panose="020B0604020202020204" pitchFamily="34" charset="0"/>
-                <a:ea typeface="MS PGothic" panose="020B0600070205080204" pitchFamily="34" charset="-128"/>
-              </a:defRPr>
-            </a:lvl2pPr>
-            <a:lvl3pPr marL="1143000" indent="-228600" eaLnBrk="0" hangingPunct="0">
-              <a:tabLst>
-                <a:tab pos="635000" algn="l"/>
-              </a:tabLst>
-              <a:defRPr sz="3200">
-                <a:solidFill>
-                  <a:schemeClr val="tx1"/>
-                </a:solidFill>
-                <a:latin typeface="Helvetica" panose="020B0604020202020204" pitchFamily="34" charset="0"/>
-                <a:ea typeface="MS PGothic" panose="020B0600070205080204" pitchFamily="34" charset="-128"/>
-              </a:defRPr>
-            </a:lvl3pPr>
-            <a:lvl4pPr marL="1600200" indent="-228600" eaLnBrk="0" hangingPunct="0">
-              <a:tabLst>
-                <a:tab pos="635000" algn="l"/>
-              </a:tabLst>
-              <a:defRPr sz="3200">
-                <a:solidFill>
-                  <a:schemeClr val="tx1"/>
-                </a:solidFill>
-                <a:latin typeface="Helvetica" panose="020B0604020202020204" pitchFamily="34" charset="0"/>
-                <a:ea typeface="MS PGothic" panose="020B0600070205080204" pitchFamily="34" charset="-128"/>
-              </a:defRPr>
-            </a:lvl4pPr>
-            <a:lvl5pPr marL="2057400" indent="-228600" eaLnBrk="0" hangingPunct="0">
-              <a:tabLst>
-                <a:tab pos="635000" algn="l"/>
-              </a:tabLst>
-              <a:defRPr sz="3200">
-                <a:solidFill>
-                  <a:schemeClr val="tx1"/>
-                </a:solidFill>
-                <a:latin typeface="Helvetica" panose="020B0604020202020204" pitchFamily="34" charset="0"/>
-                <a:ea typeface="MS PGothic" panose="020B0600070205080204" pitchFamily="34" charset="-128"/>
-              </a:defRPr>
-            </a:lvl5pPr>
-            <a:lvl6pPr marL="2514600" indent="-228600" eaLnBrk="0" fontAlgn="base" hangingPunct="0">
-              <a:spcBef>
-                <a:spcPct val="0"/>
-              </a:spcBef>
-              <a:spcAft>
-                <a:spcPct val="0"/>
-              </a:spcAft>
-              <a:tabLst>
-                <a:tab pos="635000" algn="l"/>
-              </a:tabLst>
-              <a:defRPr sz="3200">
-                <a:solidFill>
-                  <a:schemeClr val="tx1"/>
-                </a:solidFill>
-                <a:latin typeface="Helvetica" panose="020B0604020202020204" pitchFamily="34" charset="0"/>
-                <a:ea typeface="MS PGothic" panose="020B0600070205080204" pitchFamily="34" charset="-128"/>
-              </a:defRPr>
-            </a:lvl6pPr>
-            <a:lvl7pPr marL="2971800" indent="-228600" eaLnBrk="0" fontAlgn="base" hangingPunct="0">
-              <a:spcBef>
-                <a:spcPct val="0"/>
-              </a:spcBef>
-              <a:spcAft>
-                <a:spcPct val="0"/>
-              </a:spcAft>
-              <a:tabLst>
-                <a:tab pos="635000" algn="l"/>
-              </a:tabLst>
-              <a:defRPr sz="3200">
-                <a:solidFill>
-                  <a:schemeClr val="tx1"/>
-                </a:solidFill>
-                <a:latin typeface="Helvetica" panose="020B0604020202020204" pitchFamily="34" charset="0"/>
-                <a:ea typeface="MS PGothic" panose="020B0600070205080204" pitchFamily="34" charset="-128"/>
-              </a:defRPr>
-            </a:lvl7pPr>
-            <a:lvl8pPr marL="3429000" indent="-228600" eaLnBrk="0" fontAlgn="base" hangingPunct="0">
-              <a:spcBef>
-                <a:spcPct val="0"/>
-              </a:spcBef>
-              <a:spcAft>
-                <a:spcPct val="0"/>
-              </a:spcAft>
-              <a:tabLst>
-                <a:tab pos="635000" algn="l"/>
-              </a:tabLst>
-              <a:defRPr sz="3200">
-                <a:solidFill>
-                  <a:schemeClr val="tx1"/>
-                </a:solidFill>
-                <a:latin typeface="Helvetica" panose="020B0604020202020204" pitchFamily="34" charset="0"/>
-                <a:ea typeface="MS PGothic" panose="020B0600070205080204" pitchFamily="34" charset="-128"/>
-              </a:defRPr>
-            </a:lvl8pPr>
-            <a:lvl9pPr marL="3886200" indent="-228600" eaLnBrk="0" fontAlgn="base" hangingPunct="0">
-              <a:spcBef>
-                <a:spcPct val="0"/>
-              </a:spcBef>
-              <a:spcAft>
-                <a:spcPct val="0"/>
-              </a:spcAft>
-              <a:tabLst>
-                <a:tab pos="635000" algn="l"/>
-              </a:tabLst>
-              <a:defRPr sz="3200">
-                <a:solidFill>
-                  <a:schemeClr val="tx1"/>
-                </a:solidFill>
-                <a:latin typeface="Helvetica" panose="020B0604020202020204" pitchFamily="34" charset="0"/>
-                <a:ea typeface="MS PGothic" panose="020B0600070205080204" pitchFamily="34" charset="-128"/>
-              </a:defRPr>
-            </a:lvl9pPr>
-          </a:lstStyle>
-          <a:p>
-            <a:pPr eaLnBrk="1" hangingPunct="1">
-              <a:spcBef>
-                <a:spcPct val="50000"/>
-              </a:spcBef>
-            </a:pPr>
-            <a:r>
-              <a:rPr lang="en-US" altLang="en-US" sz="4800" b="1" dirty="0">
-                <a:solidFill>
-                  <a:srgbClr val="000000"/>
-                </a:solidFill>
-                <a:latin typeface="Avenir Heavy" pitchFamily="124" charset="0"/>
-              </a:rPr>
-              <a:t>Findings</a:t>
-            </a:r>
-          </a:p>
-          <a:p>
-            <a:pPr eaLnBrk="1" hangingPunct="1">
-              <a:spcBef>
-                <a:spcPct val="50000"/>
-              </a:spcBef>
-            </a:pPr>
-            <a:r>
-              <a:rPr lang="en-US" altLang="ja-JP" sz="4800" dirty="0">
-                <a:latin typeface="Avenir Book" pitchFamily="124" charset="0"/>
-              </a:rPr>
-              <a:t>Explain why outcome is interesting. Don’t assume it’s obvious. Three sentences max</a:t>
-            </a:r>
-          </a:p>
-        </p:txBody>
-      </p:sp>
-      <p:sp>
-        <p:nvSpPr>
-          <p:cNvPr id="14345" name="Text Box 16">
-            <a:extLst>
-              <a:ext uri="{FF2B5EF4-FFF2-40B4-BE49-F238E27FC236}">
-                <a16:creationId xmlns:a16="http://schemas.microsoft.com/office/drawing/2014/main" id="{5CB4B1E0-5DC9-C6C0-A4BC-6E6D4442DF4F}"/>
-              </a:ext>
-            </a:extLst>
-          </p:cNvPr>
-          <p:cNvSpPr txBox="1">
-            <a:spLocks noChangeArrowheads="1"/>
-          </p:cNvSpPr>
-          <p:nvPr/>
-        </p:nvSpPr>
-        <p:spPr bwMode="auto">
-          <a:xfrm>
-            <a:off x="38595300" y="21355278"/>
-            <a:ext cx="10811782" cy="4182608"/>
-          </a:xfrm>
-          <a:prstGeom prst="rect">
-            <a:avLst/>
-          </a:prstGeom>
-          <a:solidFill>
-            <a:schemeClr val="bg1"/>
-          </a:solidFill>
-          <a:ln w="38100">
-            <a:solidFill>
-              <a:srgbClr val="000000"/>
-            </a:solidFill>
-            <a:round/>
-            <a:headEnd/>
-            <a:tailEnd/>
-          </a:ln>
-        </p:spPr>
-        <p:txBody>
-          <a:bodyPr lIns="914400" tIns="457200" rIns="914400" bIns="914400"/>
-          <a:lstStyle>
-            <a:lvl1pPr eaLnBrk="0" hangingPunct="0">
-              <a:defRPr sz="3200">
-                <a:solidFill>
-                  <a:schemeClr val="tx1"/>
-                </a:solidFill>
-                <a:latin typeface="Helvetica" panose="020B0604020202020204" pitchFamily="34" charset="0"/>
-                <a:ea typeface="MS PGothic" panose="020B0600070205080204" pitchFamily="34" charset="-128"/>
-              </a:defRPr>
-            </a:lvl1pPr>
-            <a:lvl2pPr marL="742950" indent="-285750" eaLnBrk="0" hangingPunct="0">
-              <a:defRPr sz="3200">
-                <a:solidFill>
-                  <a:schemeClr val="tx1"/>
-                </a:solidFill>
-                <a:latin typeface="Helvetica" panose="020B0604020202020204" pitchFamily="34" charset="0"/>
-                <a:ea typeface="MS PGothic" panose="020B0600070205080204" pitchFamily="34" charset="-128"/>
-              </a:defRPr>
-            </a:lvl2pPr>
-            <a:lvl3pPr marL="1143000" indent="-228600" eaLnBrk="0" hangingPunct="0">
-              <a:defRPr sz="3200">
-                <a:solidFill>
-                  <a:schemeClr val="tx1"/>
-                </a:solidFill>
-                <a:latin typeface="Helvetica" panose="020B0604020202020204" pitchFamily="34" charset="0"/>
-                <a:ea typeface="MS PGothic" panose="020B0600070205080204" pitchFamily="34" charset="-128"/>
-              </a:defRPr>
-            </a:lvl3pPr>
-            <a:lvl4pPr marL="1600200" indent="-228600" eaLnBrk="0" hangingPunct="0">
-              <a:defRPr sz="3200">
-                <a:solidFill>
-                  <a:schemeClr val="tx1"/>
-                </a:solidFill>
-                <a:latin typeface="Helvetica" panose="020B0604020202020204" pitchFamily="34" charset="0"/>
-                <a:ea typeface="MS PGothic" panose="020B0600070205080204" pitchFamily="34" charset="-128"/>
-              </a:defRPr>
-            </a:lvl4pPr>
-            <a:lvl5pPr marL="2057400" indent="-228600" eaLnBrk="0" hangingPunct="0">
-              <a:defRPr sz="3200">
-                <a:solidFill>
-                  <a:schemeClr val="tx1"/>
-                </a:solidFill>
-                <a:latin typeface="Helvetica" panose="020B0604020202020204" pitchFamily="34" charset="0"/>
-                <a:ea typeface="MS PGothic" panose="020B0600070205080204" pitchFamily="34" charset="-128"/>
-              </a:defRPr>
-            </a:lvl5pPr>
-            <a:lvl6pPr marL="2514600" indent="-228600" eaLnBrk="0" fontAlgn="base" hangingPunct="0">
-              <a:spcBef>
-                <a:spcPct val="0"/>
-              </a:spcBef>
-              <a:spcAft>
-                <a:spcPct val="0"/>
-              </a:spcAft>
-              <a:defRPr sz="3200">
-                <a:solidFill>
-                  <a:schemeClr val="tx1"/>
-                </a:solidFill>
-                <a:latin typeface="Helvetica" panose="020B0604020202020204" pitchFamily="34" charset="0"/>
-                <a:ea typeface="MS PGothic" panose="020B0600070205080204" pitchFamily="34" charset="-128"/>
-              </a:defRPr>
-            </a:lvl6pPr>
-            <a:lvl7pPr marL="2971800" indent="-228600" eaLnBrk="0" fontAlgn="base" hangingPunct="0">
-              <a:spcBef>
-                <a:spcPct val="0"/>
-              </a:spcBef>
-              <a:spcAft>
-                <a:spcPct val="0"/>
-              </a:spcAft>
-              <a:defRPr sz="3200">
-                <a:solidFill>
-                  <a:schemeClr val="tx1"/>
-                </a:solidFill>
-                <a:latin typeface="Helvetica" panose="020B0604020202020204" pitchFamily="34" charset="0"/>
-                <a:ea typeface="MS PGothic" panose="020B0600070205080204" pitchFamily="34" charset="-128"/>
-              </a:defRPr>
-            </a:lvl7pPr>
-            <a:lvl8pPr marL="3429000" indent="-228600" eaLnBrk="0" fontAlgn="base" hangingPunct="0">
-              <a:spcBef>
-                <a:spcPct val="0"/>
-              </a:spcBef>
-              <a:spcAft>
-                <a:spcPct val="0"/>
-              </a:spcAft>
-              <a:defRPr sz="3200">
-                <a:solidFill>
-                  <a:schemeClr val="tx1"/>
-                </a:solidFill>
-                <a:latin typeface="Helvetica" panose="020B0604020202020204" pitchFamily="34" charset="0"/>
-                <a:ea typeface="MS PGothic" panose="020B0600070205080204" pitchFamily="34" charset="-128"/>
-              </a:defRPr>
-            </a:lvl8pPr>
-            <a:lvl9pPr marL="3886200" indent="-228600" eaLnBrk="0" fontAlgn="base" hangingPunct="0">
-              <a:spcBef>
-                <a:spcPct val="0"/>
-              </a:spcBef>
-              <a:spcAft>
-                <a:spcPct val="0"/>
-              </a:spcAft>
-              <a:defRPr sz="3200">
-                <a:solidFill>
-                  <a:schemeClr val="tx1"/>
-                </a:solidFill>
-                <a:latin typeface="Helvetica" panose="020B0604020202020204" pitchFamily="34" charset="0"/>
-                <a:ea typeface="MS PGothic" panose="020B0600070205080204" pitchFamily="34" charset="-128"/>
-              </a:defRPr>
-            </a:lvl9pPr>
-          </a:lstStyle>
-          <a:p>
-            <a:pPr eaLnBrk="1" hangingPunct="1">
-              <a:spcBef>
-                <a:spcPct val="50000"/>
-              </a:spcBef>
-            </a:pPr>
-            <a:r>
-              <a:rPr lang="en-US" altLang="en-US" sz="4400" b="1" dirty="0">
-                <a:solidFill>
-                  <a:srgbClr val="000000"/>
-                </a:solidFill>
-                <a:latin typeface="Avenir Heavy" pitchFamily="124" charset="0"/>
-              </a:rPr>
-              <a:t>Next Steps</a:t>
-            </a:r>
-          </a:p>
-          <a:p>
-            <a:pPr marL="571500" indent="-571500" eaLnBrk="1" hangingPunct="1">
-              <a:spcBef>
-                <a:spcPts val="1200"/>
-              </a:spcBef>
-              <a:buFont typeface="Arial" panose="020B0604020202020204" pitchFamily="34" charset="0"/>
-              <a:buChar char="•"/>
-            </a:pPr>
-            <a:r>
-              <a:rPr lang="en-US" altLang="en-US" sz="3600" dirty="0">
-                <a:latin typeface="Avenir Book" pitchFamily="124" charset="0"/>
-              </a:rPr>
-              <a:t>[]</a:t>
-            </a:r>
-          </a:p>
-        </p:txBody>
-      </p:sp>
-      <p:sp>
-        <p:nvSpPr>
-          <p:cNvPr id="14346" name="Text Box 15">
-            <a:extLst>
-              <a:ext uri="{FF2B5EF4-FFF2-40B4-BE49-F238E27FC236}">
-                <a16:creationId xmlns:a16="http://schemas.microsoft.com/office/drawing/2014/main" id="{B69C3B60-0B0B-4842-F1AD-CEDAC86EEF16}"/>
-              </a:ext>
-            </a:extLst>
-          </p:cNvPr>
-          <p:cNvSpPr txBox="1">
-            <a:spLocks noChangeArrowheads="1"/>
-          </p:cNvSpPr>
-          <p:nvPr/>
-        </p:nvSpPr>
-        <p:spPr bwMode="auto">
-          <a:xfrm>
-            <a:off x="38595300" y="17175163"/>
-            <a:ext cx="10811782" cy="4182608"/>
-          </a:xfrm>
-          <a:prstGeom prst="rect">
-            <a:avLst/>
-          </a:prstGeom>
-          <a:solidFill>
-            <a:schemeClr val="bg1"/>
-          </a:solidFill>
-          <a:ln w="38100">
-            <a:solidFill>
-              <a:srgbClr val="000000"/>
-            </a:solidFill>
-            <a:round/>
-            <a:headEnd/>
-            <a:tailEnd/>
-          </a:ln>
-        </p:spPr>
-        <p:txBody>
-          <a:bodyPr lIns="914400" tIns="457200" rIns="914400" bIns="914400"/>
-          <a:lstStyle>
-            <a:lvl1pPr marL="500063" indent="-500063" eaLnBrk="0" hangingPunct="0">
-              <a:defRPr sz="3200">
-                <a:solidFill>
-                  <a:schemeClr val="tx1"/>
-                </a:solidFill>
-                <a:latin typeface="Helvetica" panose="020B0604020202020204" pitchFamily="34" charset="0"/>
-                <a:ea typeface="MS PGothic" panose="020B0600070205080204" pitchFamily="34" charset="-128"/>
-              </a:defRPr>
-            </a:lvl1pPr>
-            <a:lvl2pPr marL="742950" indent="-285750" eaLnBrk="0" hangingPunct="0">
-              <a:defRPr sz="3200">
-                <a:solidFill>
-                  <a:schemeClr val="tx1"/>
-                </a:solidFill>
-                <a:latin typeface="Helvetica" panose="020B0604020202020204" pitchFamily="34" charset="0"/>
-                <a:ea typeface="MS PGothic" panose="020B0600070205080204" pitchFamily="34" charset="-128"/>
-              </a:defRPr>
-            </a:lvl2pPr>
-            <a:lvl3pPr marL="1143000" indent="-228600" eaLnBrk="0" hangingPunct="0">
-              <a:defRPr sz="3200">
-                <a:solidFill>
-                  <a:schemeClr val="tx1"/>
-                </a:solidFill>
-                <a:latin typeface="Helvetica" panose="020B0604020202020204" pitchFamily="34" charset="0"/>
-                <a:ea typeface="MS PGothic" panose="020B0600070205080204" pitchFamily="34" charset="-128"/>
-              </a:defRPr>
-            </a:lvl3pPr>
-            <a:lvl4pPr marL="1600200" indent="-228600" eaLnBrk="0" hangingPunct="0">
-              <a:defRPr sz="3200">
-                <a:solidFill>
-                  <a:schemeClr val="tx1"/>
-                </a:solidFill>
-                <a:latin typeface="Helvetica" panose="020B0604020202020204" pitchFamily="34" charset="0"/>
-                <a:ea typeface="MS PGothic" panose="020B0600070205080204" pitchFamily="34" charset="-128"/>
-              </a:defRPr>
-            </a:lvl4pPr>
-            <a:lvl5pPr marL="2057400" indent="-228600" eaLnBrk="0" hangingPunct="0">
-              <a:defRPr sz="3200">
-                <a:solidFill>
-                  <a:schemeClr val="tx1"/>
-                </a:solidFill>
-                <a:latin typeface="Helvetica" panose="020B0604020202020204" pitchFamily="34" charset="0"/>
-                <a:ea typeface="MS PGothic" panose="020B0600070205080204" pitchFamily="34" charset="-128"/>
-              </a:defRPr>
-            </a:lvl5pPr>
-            <a:lvl6pPr marL="2514600" indent="-228600" eaLnBrk="0" fontAlgn="base" hangingPunct="0">
-              <a:spcBef>
-                <a:spcPct val="0"/>
-              </a:spcBef>
-              <a:spcAft>
-                <a:spcPct val="0"/>
-              </a:spcAft>
-              <a:defRPr sz="3200">
-                <a:solidFill>
-                  <a:schemeClr val="tx1"/>
-                </a:solidFill>
-                <a:latin typeface="Helvetica" panose="020B0604020202020204" pitchFamily="34" charset="0"/>
-                <a:ea typeface="MS PGothic" panose="020B0600070205080204" pitchFamily="34" charset="-128"/>
-              </a:defRPr>
-            </a:lvl6pPr>
-            <a:lvl7pPr marL="2971800" indent="-228600" eaLnBrk="0" fontAlgn="base" hangingPunct="0">
-              <a:spcBef>
-                <a:spcPct val="0"/>
-              </a:spcBef>
-              <a:spcAft>
-                <a:spcPct val="0"/>
-              </a:spcAft>
-              <a:defRPr sz="3200">
-                <a:solidFill>
-                  <a:schemeClr val="tx1"/>
-                </a:solidFill>
-                <a:latin typeface="Helvetica" panose="020B0604020202020204" pitchFamily="34" charset="0"/>
-                <a:ea typeface="MS PGothic" panose="020B0600070205080204" pitchFamily="34" charset="-128"/>
-              </a:defRPr>
-            </a:lvl7pPr>
-            <a:lvl8pPr marL="3429000" indent="-228600" eaLnBrk="0" fontAlgn="base" hangingPunct="0">
-              <a:spcBef>
-                <a:spcPct val="0"/>
-              </a:spcBef>
-              <a:spcAft>
-                <a:spcPct val="0"/>
-              </a:spcAft>
-              <a:defRPr sz="3200">
-                <a:solidFill>
-                  <a:schemeClr val="tx1"/>
-                </a:solidFill>
-                <a:latin typeface="Helvetica" panose="020B0604020202020204" pitchFamily="34" charset="0"/>
-                <a:ea typeface="MS PGothic" panose="020B0600070205080204" pitchFamily="34" charset="-128"/>
-              </a:defRPr>
-            </a:lvl8pPr>
-            <a:lvl9pPr marL="3886200" indent="-228600" eaLnBrk="0" fontAlgn="base" hangingPunct="0">
-              <a:spcBef>
-                <a:spcPct val="0"/>
-              </a:spcBef>
-              <a:spcAft>
-                <a:spcPct val="0"/>
-              </a:spcAft>
-              <a:defRPr sz="3200">
-                <a:solidFill>
-                  <a:schemeClr val="tx1"/>
-                </a:solidFill>
-                <a:latin typeface="Helvetica" panose="020B0604020202020204" pitchFamily="34" charset="0"/>
-                <a:ea typeface="MS PGothic" panose="020B0600070205080204" pitchFamily="34" charset="-128"/>
-              </a:defRPr>
-            </a:lvl9pPr>
-          </a:lstStyle>
-          <a:p>
-            <a:pPr eaLnBrk="1" hangingPunct="1">
-              <a:spcBef>
-                <a:spcPct val="50000"/>
-              </a:spcBef>
-            </a:pPr>
-            <a:r>
-              <a:rPr lang="en-US" altLang="en-US" sz="4400" b="1" dirty="0">
-                <a:solidFill>
-                  <a:srgbClr val="000000"/>
-                </a:solidFill>
-                <a:latin typeface="Avenir Heavy" pitchFamily="124" charset="0"/>
-              </a:rPr>
-              <a:t>Implications</a:t>
-            </a:r>
-          </a:p>
-          <a:p>
-            <a:pPr marL="571500" indent="-571500" eaLnBrk="1" hangingPunct="1">
-              <a:spcBef>
-                <a:spcPts val="1200"/>
-              </a:spcBef>
-              <a:buFont typeface="Arial" panose="020B0604020202020204" pitchFamily="34" charset="0"/>
-              <a:buChar char="•"/>
-            </a:pPr>
-            <a:r>
-              <a:rPr lang="en-US" altLang="en-US" sz="3600" dirty="0">
-                <a:latin typeface="Avenir Book" pitchFamily="124" charset="0"/>
-              </a:rPr>
-              <a:t>[]</a:t>
-            </a:r>
-          </a:p>
-          <a:p>
-            <a:pPr eaLnBrk="1" hangingPunct="1"/>
-            <a:br>
-              <a:rPr lang="en-US" altLang="en-US" sz="2800" dirty="0">
-                <a:latin typeface="Avenir Book" pitchFamily="124" charset="0"/>
-              </a:rPr>
-            </a:br>
-            <a:endParaRPr lang="en-US" altLang="en-US" sz="2800" dirty="0">
-              <a:latin typeface="Avenir Book" pitchFamily="124" charset="0"/>
-            </a:endParaRPr>
-          </a:p>
-          <a:p>
-            <a:pPr eaLnBrk="1" hangingPunct="1">
-              <a:spcBef>
-                <a:spcPct val="10000"/>
-              </a:spcBef>
-            </a:pPr>
-            <a:endParaRPr lang="en-US" altLang="en-US" sz="2800" dirty="0">
-              <a:latin typeface="Avenir Book" pitchFamily="124" charset="0"/>
-            </a:endParaRPr>
-          </a:p>
-        </p:txBody>
-      </p:sp>
-      <p:sp>
-        <p:nvSpPr>
-          <p:cNvPr id="14347" name="Text Box 70">
-            <a:extLst>
-              <a:ext uri="{FF2B5EF4-FFF2-40B4-BE49-F238E27FC236}">
-                <a16:creationId xmlns:a16="http://schemas.microsoft.com/office/drawing/2014/main" id="{BCE6D896-7C32-3496-1DCE-1B1F297F93C3}"/>
-              </a:ext>
-            </a:extLst>
-          </p:cNvPr>
-          <p:cNvSpPr txBox="1">
-            <a:spLocks noChangeArrowheads="1"/>
-          </p:cNvSpPr>
-          <p:nvPr/>
-        </p:nvSpPr>
-        <p:spPr bwMode="auto">
-          <a:xfrm>
-            <a:off x="38595300" y="25537886"/>
-            <a:ext cx="10811782" cy="4049485"/>
-          </a:xfrm>
-          <a:prstGeom prst="rect">
-            <a:avLst/>
-          </a:prstGeom>
-          <a:solidFill>
-            <a:schemeClr val="bg1"/>
-          </a:solidFill>
-          <a:ln w="38100">
-            <a:solidFill>
-              <a:srgbClr val="000000"/>
-            </a:solidFill>
-            <a:round/>
-            <a:headEnd/>
-            <a:tailEnd/>
-          </a:ln>
-        </p:spPr>
-        <p:txBody>
-          <a:bodyPr lIns="914400" tIns="457200" rIns="914400" bIns="914400"/>
-          <a:lstStyle>
-            <a:lvl1pPr eaLnBrk="0" hangingPunct="0">
-              <a:defRPr sz="3200">
-                <a:solidFill>
-                  <a:schemeClr val="tx1"/>
-                </a:solidFill>
-                <a:latin typeface="Helvetica" panose="020B0604020202020204" pitchFamily="34" charset="0"/>
-                <a:ea typeface="MS PGothic" panose="020B0600070205080204" pitchFamily="34" charset="-128"/>
-              </a:defRPr>
-            </a:lvl1pPr>
-            <a:lvl2pPr marL="742950" indent="-285750" eaLnBrk="0" hangingPunct="0">
-              <a:defRPr sz="3200">
-                <a:solidFill>
-                  <a:schemeClr val="tx1"/>
-                </a:solidFill>
-                <a:latin typeface="Helvetica" panose="020B0604020202020204" pitchFamily="34" charset="0"/>
-                <a:ea typeface="MS PGothic" panose="020B0600070205080204" pitchFamily="34" charset="-128"/>
-              </a:defRPr>
-            </a:lvl2pPr>
-            <a:lvl3pPr marL="1143000" indent="-228600" eaLnBrk="0" hangingPunct="0">
-              <a:defRPr sz="3200">
-                <a:solidFill>
-                  <a:schemeClr val="tx1"/>
-                </a:solidFill>
-                <a:latin typeface="Helvetica" panose="020B0604020202020204" pitchFamily="34" charset="0"/>
-                <a:ea typeface="MS PGothic" panose="020B0600070205080204" pitchFamily="34" charset="-128"/>
-              </a:defRPr>
-            </a:lvl3pPr>
-            <a:lvl4pPr marL="1600200" indent="-228600" eaLnBrk="0" hangingPunct="0">
-              <a:defRPr sz="3200">
-                <a:solidFill>
-                  <a:schemeClr val="tx1"/>
-                </a:solidFill>
-                <a:latin typeface="Helvetica" panose="020B0604020202020204" pitchFamily="34" charset="0"/>
-                <a:ea typeface="MS PGothic" panose="020B0600070205080204" pitchFamily="34" charset="-128"/>
-              </a:defRPr>
-            </a:lvl4pPr>
-            <a:lvl5pPr marL="2057400" indent="-228600" eaLnBrk="0" hangingPunct="0">
-              <a:defRPr sz="3200">
-                <a:solidFill>
-                  <a:schemeClr val="tx1"/>
-                </a:solidFill>
-                <a:latin typeface="Helvetica" panose="020B0604020202020204" pitchFamily="34" charset="0"/>
-                <a:ea typeface="MS PGothic" panose="020B0600070205080204" pitchFamily="34" charset="-128"/>
-              </a:defRPr>
-            </a:lvl5pPr>
-            <a:lvl6pPr marL="2514600" indent="-228600" eaLnBrk="0" fontAlgn="base" hangingPunct="0">
-              <a:spcBef>
-                <a:spcPct val="0"/>
-              </a:spcBef>
-              <a:spcAft>
-                <a:spcPct val="0"/>
-              </a:spcAft>
-              <a:defRPr sz="3200">
-                <a:solidFill>
-                  <a:schemeClr val="tx1"/>
-                </a:solidFill>
-                <a:latin typeface="Helvetica" panose="020B0604020202020204" pitchFamily="34" charset="0"/>
-                <a:ea typeface="MS PGothic" panose="020B0600070205080204" pitchFamily="34" charset="-128"/>
-              </a:defRPr>
-            </a:lvl6pPr>
-            <a:lvl7pPr marL="2971800" indent="-228600" eaLnBrk="0" fontAlgn="base" hangingPunct="0">
-              <a:spcBef>
-                <a:spcPct val="0"/>
-              </a:spcBef>
-              <a:spcAft>
-                <a:spcPct val="0"/>
-              </a:spcAft>
-              <a:defRPr sz="3200">
-                <a:solidFill>
-                  <a:schemeClr val="tx1"/>
-                </a:solidFill>
-                <a:latin typeface="Helvetica" panose="020B0604020202020204" pitchFamily="34" charset="0"/>
-                <a:ea typeface="MS PGothic" panose="020B0600070205080204" pitchFamily="34" charset="-128"/>
-              </a:defRPr>
-            </a:lvl7pPr>
-            <a:lvl8pPr marL="3429000" indent="-228600" eaLnBrk="0" fontAlgn="base" hangingPunct="0">
-              <a:spcBef>
-                <a:spcPct val="0"/>
-              </a:spcBef>
-              <a:spcAft>
-                <a:spcPct val="0"/>
-              </a:spcAft>
-              <a:defRPr sz="3200">
-                <a:solidFill>
-                  <a:schemeClr val="tx1"/>
-                </a:solidFill>
-                <a:latin typeface="Helvetica" panose="020B0604020202020204" pitchFamily="34" charset="0"/>
-                <a:ea typeface="MS PGothic" panose="020B0600070205080204" pitchFamily="34" charset="-128"/>
-              </a:defRPr>
-            </a:lvl8pPr>
-            <a:lvl9pPr marL="3886200" indent="-228600" eaLnBrk="0" fontAlgn="base" hangingPunct="0">
-              <a:spcBef>
-                <a:spcPct val="0"/>
-              </a:spcBef>
-              <a:spcAft>
-                <a:spcPct val="0"/>
-              </a:spcAft>
-              <a:defRPr sz="3200">
-                <a:solidFill>
-                  <a:schemeClr val="tx1"/>
-                </a:solidFill>
-                <a:latin typeface="Helvetica" panose="020B0604020202020204" pitchFamily="34" charset="0"/>
-                <a:ea typeface="MS PGothic" panose="020B0600070205080204" pitchFamily="34" charset="-128"/>
-              </a:defRPr>
-            </a:lvl9pPr>
-          </a:lstStyle>
-          <a:p>
-            <a:pPr algn="just" eaLnBrk="1" hangingPunct="1"/>
-            <a:r>
-              <a:rPr lang="en-US" altLang="en-US" sz="4400" b="1" dirty="0">
-                <a:solidFill>
-                  <a:srgbClr val="000000"/>
-                </a:solidFill>
-                <a:latin typeface="Avenir Heavy" pitchFamily="124" charset="0"/>
-              </a:rPr>
-              <a:t>Data Sources</a:t>
-            </a:r>
-          </a:p>
-          <a:p>
-            <a:pPr marL="571500" indent="-571500" eaLnBrk="1" hangingPunct="1">
-              <a:spcBef>
-                <a:spcPct val="10000"/>
-              </a:spcBef>
-              <a:buFont typeface="Arial" panose="020B0604020202020204" pitchFamily="34" charset="0"/>
-              <a:buChar char="•"/>
-            </a:pPr>
-            <a:r>
-              <a:rPr lang="en-US" altLang="en-US" sz="3600" dirty="0" err="1">
-                <a:solidFill>
-                  <a:srgbClr val="000000"/>
-                </a:solidFill>
-                <a:latin typeface="Avenir Book" pitchFamily="124" charset="0"/>
-              </a:rPr>
-              <a:t>NBA.com’s</a:t>
-            </a:r>
-            <a:r>
-              <a:rPr lang="en-US" altLang="en-US" sz="3600" dirty="0">
-                <a:solidFill>
-                  <a:srgbClr val="000000"/>
-                </a:solidFill>
-                <a:latin typeface="Avenir Book" pitchFamily="124" charset="0"/>
-              </a:rPr>
-              <a:t> official stats website</a:t>
-            </a:r>
-          </a:p>
-          <a:p>
-            <a:pPr marL="571500" indent="-571500" eaLnBrk="1" hangingPunct="1">
-              <a:spcBef>
-                <a:spcPct val="10000"/>
-              </a:spcBef>
-              <a:buFont typeface="Arial" panose="020B0604020202020204" pitchFamily="34" charset="0"/>
-              <a:buChar char="•"/>
-            </a:pPr>
-            <a:r>
-              <a:rPr lang="en-US" altLang="en-US" sz="3600" dirty="0">
-                <a:solidFill>
-                  <a:srgbClr val="000000"/>
-                </a:solidFill>
-                <a:latin typeface="Avenir Book" pitchFamily="124" charset="0"/>
-              </a:rPr>
-              <a:t>Used the stats.nba.com API to scrape traditional and advanced box score data</a:t>
-            </a:r>
-            <a:endParaRPr lang="en-US" altLang="en-US" sz="3600" dirty="0">
-              <a:latin typeface="Avenir Book" pitchFamily="124" charset="0"/>
-            </a:endParaRPr>
-          </a:p>
-          <a:p>
-            <a:pPr eaLnBrk="1" hangingPunct="1">
-              <a:spcBef>
-                <a:spcPct val="10000"/>
-              </a:spcBef>
-            </a:pPr>
-            <a:endParaRPr lang="en-US" altLang="en-US" sz="2800" dirty="0">
-              <a:latin typeface="Avenir Book" pitchFamily="124" charset="0"/>
-            </a:endParaRPr>
-          </a:p>
-        </p:txBody>
-      </p:sp>
-      <p:sp>
-        <p:nvSpPr>
-          <p:cNvPr id="14348" name="Text Box 7">
-            <a:extLst>
-              <a:ext uri="{FF2B5EF4-FFF2-40B4-BE49-F238E27FC236}">
-                <a16:creationId xmlns:a16="http://schemas.microsoft.com/office/drawing/2014/main" id="{B0E97086-7DA8-5BE6-2BCF-05782062FB84}"/>
-              </a:ext>
-            </a:extLst>
-          </p:cNvPr>
-          <p:cNvSpPr txBox="1">
-            <a:spLocks noChangeArrowheads="1"/>
-          </p:cNvSpPr>
-          <p:nvPr/>
-        </p:nvSpPr>
-        <p:spPr bwMode="auto">
-          <a:xfrm>
-            <a:off x="17765713" y="13822363"/>
-            <a:ext cx="15678150" cy="4741862"/>
-          </a:xfrm>
-          <a:prstGeom prst="rect">
-            <a:avLst/>
-          </a:prstGeom>
-          <a:solidFill>
-            <a:srgbClr val="FFFE7E"/>
-          </a:solidFill>
-          <a:ln w="38100">
-            <a:solidFill>
-              <a:srgbClr val="000000"/>
-            </a:solidFill>
-            <a:round/>
-            <a:headEnd/>
-            <a:tailEnd/>
-          </a:ln>
-        </p:spPr>
-        <p:txBody>
-          <a:bodyPr lIns="914400" tIns="457200" rIns="914400" bIns="914400"/>
-          <a:lstStyle>
-            <a:lvl1pPr eaLnBrk="0" hangingPunct="0">
-              <a:tabLst>
-                <a:tab pos="500063" algn="l"/>
-              </a:tabLst>
-              <a:defRPr sz="3200">
-                <a:solidFill>
-                  <a:schemeClr val="tx1"/>
-                </a:solidFill>
-                <a:latin typeface="Helvetica" panose="020B0604020202020204" pitchFamily="34" charset="0"/>
-                <a:ea typeface="MS PGothic" panose="020B0600070205080204" pitchFamily="34" charset="-128"/>
-              </a:defRPr>
-            </a:lvl1pPr>
-            <a:lvl2pPr marL="742950" indent="-285750" eaLnBrk="0" hangingPunct="0">
-              <a:tabLst>
-                <a:tab pos="500063" algn="l"/>
-              </a:tabLst>
-              <a:defRPr sz="3200">
-                <a:solidFill>
-                  <a:schemeClr val="tx1"/>
-                </a:solidFill>
-                <a:latin typeface="Helvetica" panose="020B0604020202020204" pitchFamily="34" charset="0"/>
-                <a:ea typeface="MS PGothic" panose="020B0600070205080204" pitchFamily="34" charset="-128"/>
-              </a:defRPr>
-            </a:lvl2pPr>
-            <a:lvl3pPr marL="1143000" indent="-228600" eaLnBrk="0" hangingPunct="0">
-              <a:tabLst>
-                <a:tab pos="500063" algn="l"/>
-              </a:tabLst>
-              <a:defRPr sz="3200">
-                <a:solidFill>
-                  <a:schemeClr val="tx1"/>
-                </a:solidFill>
-                <a:latin typeface="Helvetica" panose="020B0604020202020204" pitchFamily="34" charset="0"/>
-                <a:ea typeface="MS PGothic" panose="020B0600070205080204" pitchFamily="34" charset="-128"/>
-              </a:defRPr>
-            </a:lvl3pPr>
-            <a:lvl4pPr marL="1600200" indent="-228600" eaLnBrk="0" hangingPunct="0">
-              <a:tabLst>
-                <a:tab pos="500063" algn="l"/>
-              </a:tabLst>
-              <a:defRPr sz="3200">
-                <a:solidFill>
-                  <a:schemeClr val="tx1"/>
-                </a:solidFill>
-                <a:latin typeface="Helvetica" panose="020B0604020202020204" pitchFamily="34" charset="0"/>
-                <a:ea typeface="MS PGothic" panose="020B0600070205080204" pitchFamily="34" charset="-128"/>
-              </a:defRPr>
-            </a:lvl4pPr>
-            <a:lvl5pPr marL="2057400" indent="-228600" eaLnBrk="0" hangingPunct="0">
-              <a:tabLst>
-                <a:tab pos="500063" algn="l"/>
-              </a:tabLst>
-              <a:defRPr sz="3200">
-                <a:solidFill>
-                  <a:schemeClr val="tx1"/>
-                </a:solidFill>
-                <a:latin typeface="Helvetica" panose="020B0604020202020204" pitchFamily="34" charset="0"/>
-                <a:ea typeface="MS PGothic" panose="020B0600070205080204" pitchFamily="34" charset="-128"/>
-              </a:defRPr>
-            </a:lvl5pPr>
-            <a:lvl6pPr marL="2514600" indent="-228600" eaLnBrk="0" fontAlgn="base" hangingPunct="0">
-              <a:spcBef>
-                <a:spcPct val="0"/>
-              </a:spcBef>
-              <a:spcAft>
-                <a:spcPct val="0"/>
-              </a:spcAft>
-              <a:tabLst>
-                <a:tab pos="500063" algn="l"/>
-              </a:tabLst>
-              <a:defRPr sz="3200">
-                <a:solidFill>
-                  <a:schemeClr val="tx1"/>
-                </a:solidFill>
-                <a:latin typeface="Helvetica" panose="020B0604020202020204" pitchFamily="34" charset="0"/>
-                <a:ea typeface="MS PGothic" panose="020B0600070205080204" pitchFamily="34" charset="-128"/>
-              </a:defRPr>
-            </a:lvl6pPr>
-            <a:lvl7pPr marL="2971800" indent="-228600" eaLnBrk="0" fontAlgn="base" hangingPunct="0">
-              <a:spcBef>
-                <a:spcPct val="0"/>
-              </a:spcBef>
-              <a:spcAft>
-                <a:spcPct val="0"/>
-              </a:spcAft>
-              <a:tabLst>
-                <a:tab pos="500063" algn="l"/>
-              </a:tabLst>
-              <a:defRPr sz="3200">
-                <a:solidFill>
-                  <a:schemeClr val="tx1"/>
-                </a:solidFill>
-                <a:latin typeface="Helvetica" panose="020B0604020202020204" pitchFamily="34" charset="0"/>
-                <a:ea typeface="MS PGothic" panose="020B0600070205080204" pitchFamily="34" charset="-128"/>
-              </a:defRPr>
-            </a:lvl7pPr>
-            <a:lvl8pPr marL="3429000" indent="-228600" eaLnBrk="0" fontAlgn="base" hangingPunct="0">
-              <a:spcBef>
-                <a:spcPct val="0"/>
-              </a:spcBef>
-              <a:spcAft>
-                <a:spcPct val="0"/>
-              </a:spcAft>
-              <a:tabLst>
-                <a:tab pos="500063" algn="l"/>
-              </a:tabLst>
-              <a:defRPr sz="3200">
-                <a:solidFill>
-                  <a:schemeClr val="tx1"/>
-                </a:solidFill>
-                <a:latin typeface="Helvetica" panose="020B0604020202020204" pitchFamily="34" charset="0"/>
-                <a:ea typeface="MS PGothic" panose="020B0600070205080204" pitchFamily="34" charset="-128"/>
-              </a:defRPr>
-            </a:lvl8pPr>
-            <a:lvl9pPr marL="3886200" indent="-228600" eaLnBrk="0" fontAlgn="base" hangingPunct="0">
-              <a:spcBef>
-                <a:spcPct val="0"/>
-              </a:spcBef>
-              <a:spcAft>
-                <a:spcPct val="0"/>
-              </a:spcAft>
-              <a:tabLst>
-                <a:tab pos="500063" algn="l"/>
-              </a:tabLst>
-              <a:defRPr sz="3200">
-                <a:solidFill>
-                  <a:schemeClr val="tx1"/>
-                </a:solidFill>
-                <a:latin typeface="Helvetica" panose="020B0604020202020204" pitchFamily="34" charset="0"/>
-                <a:ea typeface="MS PGothic" panose="020B0600070205080204" pitchFamily="34" charset="-128"/>
-              </a:defRPr>
-            </a:lvl9pPr>
-          </a:lstStyle>
-          <a:p>
-            <a:pPr eaLnBrk="1" hangingPunct="1">
-              <a:lnSpc>
-                <a:spcPts val="6900"/>
-              </a:lnSpc>
-            </a:pPr>
-            <a:r>
-              <a:rPr lang="en-US" altLang="ja-JP" sz="4800" dirty="0">
-                <a:solidFill>
-                  <a:srgbClr val="FF0000"/>
-                </a:solidFill>
-                <a:latin typeface="Avenir Medium" pitchFamily="124" charset="0"/>
-              </a:rPr>
-              <a:t>If you have just one or two simple graphics, viewers will be drawn to explore them. If you have too many or they are too complicated, visitors will be repelled. </a:t>
-            </a:r>
-            <a:endParaRPr lang="en-US" altLang="en-US" sz="2800" dirty="0">
-              <a:latin typeface="Avenir Medium" pitchFamily="124" charset="0"/>
-            </a:endParaRPr>
-          </a:p>
-        </p:txBody>
-      </p:sp>
-      <p:sp>
-        <p:nvSpPr>
-          <p:cNvPr id="2" name="Rectangle: Rounded Corners 1">
-            <a:extLst>
-              <a:ext uri="{FF2B5EF4-FFF2-40B4-BE49-F238E27FC236}">
-                <a16:creationId xmlns:a16="http://schemas.microsoft.com/office/drawing/2014/main" id="{5BC111B1-8A0E-6CFC-6D24-AB4513D46AEE}"/>
-              </a:ext>
-            </a:extLst>
-          </p:cNvPr>
-          <p:cNvSpPr/>
-          <p:nvPr/>
-        </p:nvSpPr>
-        <p:spPr>
-          <a:xfrm>
-            <a:off x="1763486" y="1077686"/>
-            <a:ext cx="47646771" cy="4794476"/>
-          </a:xfrm>
-          <a:prstGeom prst="roundRect">
-            <a:avLst/>
-          </a:prstGeom>
-          <a:solidFill>
-            <a:schemeClr val="bg1"/>
-          </a:solidFill>
-        </p:spPr>
-        <p:style>
-          <a:lnRef idx="1">
-            <a:schemeClr val="accent1"/>
-          </a:lnRef>
-          <a:fillRef idx="3">
-            <a:schemeClr val="accent1"/>
-          </a:fillRef>
-          <a:effectRef idx="2">
-            <a:schemeClr val="accent1"/>
-          </a:effectRef>
-          <a:fontRef idx="minor">
-            <a:schemeClr val="lt1"/>
-          </a:fontRef>
-        </p:style>
-        <p:txBody>
-          <a:bodyPr rtlCol="0" anchor="ctr"/>
-          <a:lstStyle/>
-          <a:p>
-            <a:pPr algn="ctr">
-              <a:lnSpc>
-                <a:spcPct val="90000"/>
-              </a:lnSpc>
-              <a:defRPr/>
-            </a:pPr>
-            <a:r>
-              <a:rPr lang="en-US" sz="9600" b="0" i="0" u="none" strike="noStrike" dirty="0">
-                <a:solidFill>
-                  <a:srgbClr val="000000"/>
-                </a:solidFill>
-                <a:effectLst/>
-                <a:latin typeface="Avenir Heavy"/>
-              </a:rPr>
-              <a:t>Box Score to Bracket: Evaluating the Predictive Power of NBA Regular Season </a:t>
-            </a:r>
-          </a:p>
-          <a:p>
-            <a:pPr algn="ctr">
-              <a:lnSpc>
-                <a:spcPct val="90000"/>
-              </a:lnSpc>
-              <a:defRPr/>
-            </a:pPr>
-            <a:r>
-              <a:rPr lang="en-US" sz="9600" b="0" i="0" u="none" strike="noStrike" dirty="0">
-                <a:solidFill>
-                  <a:srgbClr val="000000"/>
-                </a:solidFill>
-                <a:effectLst/>
-                <a:latin typeface="Avenir Heavy"/>
-              </a:rPr>
-              <a:t>Performance on Playoff Outcomes</a:t>
-            </a:r>
-          </a:p>
-          <a:p>
-            <a:pPr algn="ctr">
-              <a:lnSpc>
-                <a:spcPct val="90000"/>
-              </a:lnSpc>
-              <a:defRPr/>
-            </a:pPr>
-            <a:endParaRPr lang="en-US" sz="4000" b="0" i="0" u="none" strike="noStrike" dirty="0">
-              <a:solidFill>
-                <a:srgbClr val="000000"/>
-              </a:solidFill>
-              <a:effectLst/>
-              <a:latin typeface="Avenir Heavy"/>
-            </a:endParaRPr>
-          </a:p>
-          <a:p>
-            <a:pPr algn="ctr">
-              <a:lnSpc>
-                <a:spcPct val="90000"/>
-              </a:lnSpc>
-              <a:defRPr/>
-            </a:pPr>
-            <a:r>
-              <a:rPr lang="en-US" altLang="en-US" sz="6000" b="1" dirty="0">
-                <a:solidFill>
-                  <a:schemeClr val="tx1"/>
-                </a:solidFill>
-                <a:latin typeface="Avenir Medium" pitchFamily="124" charset="0"/>
-              </a:rPr>
-              <a:t>Andrew Scheiner ’25, Sid Lamsal ’25,</a:t>
-            </a:r>
-            <a:r>
-              <a:rPr lang="en-US" altLang="en-US" sz="6000" b="1" dirty="0">
-                <a:solidFill>
-                  <a:schemeClr val="tx1"/>
-                </a:solidFill>
-                <a:latin typeface="Avenir Book" pitchFamily="124" charset="0"/>
-              </a:rPr>
-              <a:t> Department of Data Analytics, </a:t>
-            </a:r>
-            <a:r>
-              <a:rPr lang="en-US" altLang="en-US" sz="6000" dirty="0">
-                <a:solidFill>
-                  <a:schemeClr val="tx1"/>
-                </a:solidFill>
-                <a:latin typeface="Avenir Book" pitchFamily="124" charset="0"/>
-              </a:rPr>
-              <a:t>Dickinson College</a:t>
-            </a:r>
-          </a:p>
-        </p:txBody>
-      </p:sp>
-    </p:spTree>
-    <p:extLst>
-      <p:ext uri="{BB962C8B-B14F-4D97-AF65-F5344CB8AC3E}">
-        <p14:creationId xmlns:p14="http://schemas.microsoft.com/office/powerpoint/2010/main" val="2002499930"/>
-      </p:ext>
-    </p:extLst>
-  </p:cSld>
-  <p:clrMapOvr>
-    <a:overrideClrMapping bg1="lt1" tx1="dk1" bg2="lt2" tx2="dk2" accent1="accent1" accent2="accent2" accent3="accent3" accent4="accent4" accent5="accent5" accent6="accent6" hlink="hlink" folHlink="folHlink"/>
-  </p:clrMapOvr>
-</p:sld>
-</file>
-
-<file path=ppt/slides/slide2.xml><?xml version="1.0" encoding="utf-8"?>
-<p:sld xmlns:a="http://schemas.openxmlformats.org/drawingml/2006/main" xmlns:r="http://schemas.openxmlformats.org/officeDocument/2006/relationships" xmlns:p="http://schemas.openxmlformats.org/presentationml/2006/main">
-  <p:cSld>
-    <p:bg>
-      <p:bgPr>
-        <a:solidFill>
-          <a:schemeClr val="bg1"/>
-        </a:solidFill>
-        <a:effectLst/>
-      </p:bgPr>
-    </p:bg>
-    <p:spTree>
-      <p:nvGrpSpPr>
-        <p:cNvPr id="1" name="">
-          <a:extLst>
-            <a:ext uri="{FF2B5EF4-FFF2-40B4-BE49-F238E27FC236}">
               <a16:creationId xmlns:a16="http://schemas.microsoft.com/office/drawing/2014/main" id="{EDCE82C2-DBE0-5FA9-7820-3428C527F362}"/>
             </a:ext>
           </a:extLst>
@@ -7182,13 +4788,13 @@
             </a:lvl9pPr>
           </a:lstStyle>
           <a:p>
-            <a:pPr algn="just" eaLnBrk="1" hangingPunct="1">
+            <a:pPr algn="ctr" eaLnBrk="1" hangingPunct="1">
               <a:spcBef>
                 <a:spcPct val="50000"/>
               </a:spcBef>
             </a:pPr>
             <a:r>
-              <a:rPr lang="en-US" altLang="en-US" sz="4800" b="1" dirty="0">
+              <a:rPr lang="en-US" altLang="en-US" sz="4800" b="1" u="sng" dirty="0">
                 <a:latin typeface="Avenir Heavy" pitchFamily="124" charset="0"/>
               </a:rPr>
               <a:t>Introduction</a:t>
@@ -7393,13 +4999,13 @@
             </a:lvl9pPr>
           </a:lstStyle>
           <a:p>
-            <a:pPr algn="just" eaLnBrk="1" hangingPunct="1">
+            <a:pPr algn="ctr" eaLnBrk="1" hangingPunct="1">
               <a:spcBef>
                 <a:spcPct val="50000"/>
               </a:spcBef>
             </a:pPr>
             <a:r>
-              <a:rPr lang="en-US" altLang="en-US" sz="4800" b="1" dirty="0">
+              <a:rPr lang="en-US" altLang="en-US" sz="4800" b="1" u="sng" dirty="0">
                 <a:solidFill>
                   <a:srgbClr val="000000"/>
                 </a:solidFill>
@@ -7407,7 +5013,7 @@
               </a:rPr>
               <a:t>Data Processing</a:t>
             </a:r>
-            <a:endParaRPr lang="en-US" altLang="en-US" sz="4800" dirty="0">
+            <a:endParaRPr lang="en-US" altLang="en-US" sz="4800" u="sng" dirty="0">
               <a:latin typeface="Avenir Book" pitchFamily="124" charset="0"/>
             </a:endParaRPr>
           </a:p>
@@ -7476,21 +5082,7 @@
                 <a:latin typeface="Avenir Book" pitchFamily="124" charset="0"/>
                 <a:ea typeface="Cambria" panose="02040503050406030204" pitchFamily="18" charset="0"/>
               </a:rPr>
-              <a:t>Visuals were created using </a:t>
-            </a:r>
-            <a:r>
-              <a:rPr lang="en-US" altLang="en-US" sz="4400" i="1" dirty="0">
-                <a:latin typeface="Avenir Book" pitchFamily="124" charset="0"/>
-                <a:ea typeface="Cambria" panose="02040503050406030204" pitchFamily="18" charset="0"/>
-              </a:rPr>
-              <a:t>seaborn</a:t>
-            </a:r>
-            <a:r>
-              <a:rPr lang="en-US" altLang="en-US" sz="4400" dirty="0">
-                <a:latin typeface="Avenir Book" pitchFamily="124" charset="0"/>
-                <a:ea typeface="Cambria" panose="02040503050406030204" pitchFamily="18" charset="0"/>
-              </a:rPr>
-              <a:t> and </a:t>
+              <a:t>The visuals were created using </a:t>
             </a:r>
             <a:r>
               <a:rPr lang="en-US" altLang="en-US" sz="4400" i="1" dirty="0">
@@ -7524,7 +5116,7 @@
                 <a:latin typeface="Avenir Book" pitchFamily="124" charset="0"/>
                 <a:ea typeface="Cambria" panose="02040503050406030204" pitchFamily="18" charset="0"/>
               </a:rPr>
-              <a:t>Neural network was created using the </a:t>
+              <a:t>Our neural network was created using the </a:t>
             </a:r>
             <a:r>
               <a:rPr lang="en-US" altLang="en-US" sz="4400" i="1" dirty="0" err="1">
@@ -7717,9 +5309,9 @@
             </a:lvl9pPr>
           </a:lstStyle>
           <a:p>
-            <a:pPr algn="just" eaLnBrk="1" hangingPunct="1"/>
-            <a:r>
-              <a:rPr lang="en-US" altLang="en-US" sz="4800" b="1" dirty="0">
+            <a:pPr algn="ctr" eaLnBrk="1" hangingPunct="1"/>
+            <a:r>
+              <a:rPr lang="en-US" altLang="en-US" sz="4800" b="1" u="sng" dirty="0">
                 <a:solidFill>
                   <a:srgbClr val="000000"/>
                 </a:solidFill>
@@ -7997,13 +5589,13 @@
             </a:lvl9pPr>
           </a:lstStyle>
           <a:p>
-            <a:pPr eaLnBrk="1" hangingPunct="1">
+            <a:pPr algn="ctr" eaLnBrk="1" hangingPunct="1">
               <a:spcBef>
                 <a:spcPct val="50000"/>
               </a:spcBef>
             </a:pPr>
             <a:r>
-              <a:rPr lang="en-US" altLang="en-US" sz="4800" b="1" dirty="0">
+              <a:rPr lang="en-US" altLang="en-US" sz="4800" b="1" u="sng" dirty="0">
                 <a:solidFill>
                   <a:srgbClr val="000000"/>
                 </a:solidFill>
@@ -8210,19 +5802,19 @@
             </a:lvl9pPr>
           </a:lstStyle>
           <a:p>
-            <a:pPr eaLnBrk="1" hangingPunct="1">
+            <a:pPr algn="ctr" eaLnBrk="1" hangingPunct="1">
               <a:spcBef>
                 <a:spcPct val="50000"/>
               </a:spcBef>
             </a:pPr>
             <a:r>
-              <a:rPr lang="en-US" altLang="en-US" sz="4400" b="1" dirty="0">
+              <a:rPr lang="en-US" altLang="en-US" sz="4400" b="1" u="sng" dirty="0">
                 <a:solidFill>
                   <a:srgbClr val="000000"/>
                 </a:solidFill>
                 <a:latin typeface="Avenir Heavy" pitchFamily="124" charset="0"/>
               </a:rPr>
-              <a:t>Next Steps</a:t>
+              <a:t>Future Work</a:t>
             </a:r>
           </a:p>
           <a:p>
@@ -8401,13 +5993,13 @@
             </a:lvl9pPr>
           </a:lstStyle>
           <a:p>
-            <a:pPr eaLnBrk="1" hangingPunct="1">
+            <a:pPr algn="ctr" eaLnBrk="1" hangingPunct="1">
               <a:spcBef>
                 <a:spcPct val="50000"/>
               </a:spcBef>
             </a:pPr>
             <a:r>
-              <a:rPr lang="en-US" altLang="en-US" sz="4400" b="1" dirty="0">
+              <a:rPr lang="en-US" altLang="en-US" sz="4400" b="1" u="sng" dirty="0">
                 <a:solidFill>
                   <a:srgbClr val="000000"/>
                 </a:solidFill>
@@ -8443,7 +6035,7 @@
               <a:rPr lang="en-US" altLang="en-US" sz="3600" dirty="0">
                 <a:latin typeface="Avenir Book" pitchFamily="124" charset="0"/>
               </a:rPr>
-              <a:t>Our predictive margin of error was around +/- 3 games of playoff result – which is the difference between losing or advancing to the next round</a:t>
+              <a:t>Our predictive margin of error was around +/- 3 games of playoff result – which is the difference between losing or advancing to the next round.</a:t>
             </a:r>
           </a:p>
           <a:p>
@@ -8458,7 +6050,7 @@
               <a:rPr lang="en-US" altLang="en-US" sz="3600" dirty="0">
                 <a:latin typeface="Avenir Book" pitchFamily="124" charset="0"/>
               </a:rPr>
-              <a:t>Rolling average performance over stretches of games will affect prediction ability</a:t>
+              <a:t>Rolling average performance over stretches of games will affect prediction ability.</a:t>
             </a:r>
           </a:p>
           <a:p>
@@ -8640,15 +6232,15 @@
             </a:lvl9pPr>
           </a:lstStyle>
           <a:p>
-            <a:pPr algn="just" eaLnBrk="1" hangingPunct="1"/>
-            <a:r>
-              <a:rPr lang="en-US" altLang="en-US" sz="4400" b="1" dirty="0">
+            <a:pPr algn="ctr" eaLnBrk="1" hangingPunct="1"/>
+            <a:r>
+              <a:rPr lang="en-US" altLang="en-US" sz="4400" b="1" u="sng" dirty="0">
                 <a:solidFill>
                   <a:srgbClr val="000000"/>
                 </a:solidFill>
                 <a:latin typeface="Avenir Heavy" pitchFamily="124" charset="0"/>
               </a:rPr>
-              <a:t>Data Sources</a:t>
+              <a:t>Data Source</a:t>
             </a:r>
           </a:p>
           <a:p>
@@ -8675,7 +6267,7 @@
                 </a:solidFill>
                 <a:latin typeface="Avenir Book" pitchFamily="124" charset="0"/>
               </a:rPr>
-              <a:t> official stats website</a:t>
+              <a:t> official stats website.</a:t>
             </a:r>
           </a:p>
           <a:p>
@@ -8693,7 +6285,7 @@
                 </a:solidFill>
                 <a:latin typeface="Avenir Book" pitchFamily="124" charset="0"/>
               </a:rPr>
-              <a:t>Used the stats.nba.com API to scrape traditional and advanced box score data</a:t>
+              <a:t>Used the stats.nba.com API to scrape traditional and advanced box score data.</a:t>
             </a:r>
             <a:endParaRPr lang="en-US" altLang="en-US" sz="3600" dirty="0">
               <a:latin typeface="Avenir Book" pitchFamily="124" charset="0"/>
@@ -8705,9 +6297,12 @@
                 <a:spcPct val="10000"/>
               </a:spcBef>
             </a:pPr>
-            <a:endParaRPr lang="en-US" altLang="en-US" sz="2800" dirty="0">
-              <a:latin typeface="Avenir Book" pitchFamily="124" charset="0"/>
-            </a:endParaRPr>
+            <a:r>
+              <a:rPr lang="en-US" altLang="en-US" sz="2800" dirty="0">
+                <a:latin typeface="Avenir Book" pitchFamily="124" charset="0"/>
+              </a:rPr>
+              <a:t>.</a:t>
+            </a:r>
           </a:p>
         </p:txBody>
       </p:sp>
@@ -8734,6 +6329,11 @@
           <a:solidFill>
             <a:schemeClr val="bg1"/>
           </a:solidFill>
+          <a:ln w="38100">
+            <a:solidFill>
+              <a:schemeClr val="tx1"/>
+            </a:solidFill>
+          </a:ln>
         </p:spPr>
         <p:style>
           <a:lnRef idx="1">
@@ -8869,7 +6469,7 @@
         </p:blipFill>
         <p:spPr bwMode="auto">
           <a:xfrm>
-            <a:off x="17931381" y="8662383"/>
+            <a:off x="14271400" y="8662382"/>
             <a:ext cx="15129327" cy="9567331"/>
           </a:xfrm>
           <a:prstGeom prst="rect">
@@ -8889,10 +6489,10 @@
       </p:pic>
       <p:pic>
         <p:nvPicPr>
-          <p:cNvPr id="1028" name="Picture 4">
+          <p:cNvPr id="3" name="Picture 2">
             <a:extLst>
               <a:ext uri="{FF2B5EF4-FFF2-40B4-BE49-F238E27FC236}">
-                <a16:creationId xmlns:a16="http://schemas.microsoft.com/office/drawing/2014/main" id="{1A8B254E-9F2C-0AA2-4D4C-BCB73C033E8B}"/>
+                <a16:creationId xmlns:a16="http://schemas.microsoft.com/office/drawing/2014/main" id="{7BA4E215-0913-1724-4C67-1F695AC45B58}"/>
               </a:ext>
             </a:extLst>
           </p:cNvPr>
@@ -8916,8 +6516,8 @@
         </p:blipFill>
         <p:spPr bwMode="auto">
           <a:xfrm>
-            <a:off x="17931381" y="19333028"/>
-            <a:ext cx="15129327" cy="9589503"/>
+            <a:off x="21494074" y="19017442"/>
+            <a:ext cx="15129326" cy="9782200"/>
           </a:xfrm>
           <a:prstGeom prst="rect">
             <a:avLst/>
@@ -8934,6 +6534,386 @@
           </a:extLst>
         </p:spPr>
       </p:pic>
+      <p:sp>
+        <p:nvSpPr>
+          <p:cNvPr id="4" name="TextBox 3">
+            <a:extLst>
+              <a:ext uri="{FF2B5EF4-FFF2-40B4-BE49-F238E27FC236}">
+                <a16:creationId xmlns:a16="http://schemas.microsoft.com/office/drawing/2014/main" id="{D3975416-257D-D100-D313-0FEC04FFCDF6}"/>
+              </a:ext>
+            </a:extLst>
+          </p:cNvPr>
+          <p:cNvSpPr txBox="1"/>
+          <p:nvPr/>
+        </p:nvSpPr>
+        <p:spPr>
+          <a:xfrm>
+            <a:off x="14271400" y="19659600"/>
+            <a:ext cx="6952305" cy="8778346"/>
+          </a:xfrm>
+          <a:prstGeom prst="rect">
+            <a:avLst/>
+          </a:prstGeom>
+          <a:noFill/>
+          <a:ln>
+            <a:solidFill>
+              <a:schemeClr val="tx1"/>
+            </a:solidFill>
+          </a:ln>
+        </p:spPr>
+        <p:txBody>
+          <a:bodyPr wrap="square" lIns="457200" tIns="457200" rIns="457200" bIns="457200" rtlCol="0">
+            <a:spAutoFit/>
+          </a:bodyPr>
+          <a:lstStyle/>
+          <a:p>
+            <a:r>
+              <a:rPr lang="en-US" dirty="0">
+                <a:latin typeface="Avenir Book"/>
+              </a:rPr>
+              <a:t>The graph on the right displays the accuracy of our neural network progressively trained on games using the rolling averages of a team’s stats. For example, looking at </a:t>
+            </a:r>
+            <a:r>
+              <a:rPr lang="en-US" i="1" dirty="0">
+                <a:latin typeface="Avenir Book"/>
+              </a:rPr>
+              <a:t>x</a:t>
+            </a:r>
+            <a:r>
+              <a:rPr lang="en-US" dirty="0">
+                <a:latin typeface="Avenir Book"/>
+              </a:rPr>
+              <a:t> = 10, this represents game 10 in a season. The blue line represents training accuracy, which is how well game 10 predicted a team’s playoff result in the 2022-23 season. The red line at </a:t>
+            </a:r>
+            <a:r>
+              <a:rPr lang="en-US" i="1" dirty="0">
+                <a:latin typeface="Avenir Book"/>
+              </a:rPr>
+              <a:t>x</a:t>
+            </a:r>
+            <a:r>
+              <a:rPr lang="en-US" dirty="0">
+                <a:latin typeface="Avenir Book"/>
+              </a:rPr>
+              <a:t> = 10 represents how well our network predicted playoff result for our team in the next season (2023-24) at the 10</a:t>
+            </a:r>
+            <a:r>
+              <a:rPr lang="en-US" baseline="30000" dirty="0">
+                <a:latin typeface="Avenir Book"/>
+              </a:rPr>
+              <a:t>th</a:t>
+            </a:r>
+            <a:r>
+              <a:rPr lang="en-US" dirty="0">
+                <a:latin typeface="Avenir Book"/>
+              </a:rPr>
+              <a:t> game. Our model performed increasingly more accurate as the season moves along.</a:t>
+            </a:r>
+          </a:p>
+        </p:txBody>
+      </p:sp>
+      <p:sp>
+        <p:nvSpPr>
+          <p:cNvPr id="5" name="Rectangle 4">
+            <a:extLst>
+              <a:ext uri="{FF2B5EF4-FFF2-40B4-BE49-F238E27FC236}">
+                <a16:creationId xmlns:a16="http://schemas.microsoft.com/office/drawing/2014/main" id="{285BA5B7-D378-EC31-9380-2FE6E6C9072F}"/>
+              </a:ext>
+            </a:extLst>
+          </p:cNvPr>
+          <p:cNvSpPr/>
+          <p:nvPr/>
+        </p:nvSpPr>
+        <p:spPr>
+          <a:xfrm>
+            <a:off x="23822529" y="21801221"/>
+            <a:ext cx="1588164" cy="1395664"/>
+          </a:xfrm>
+          <a:prstGeom prst="rect">
+            <a:avLst/>
+          </a:prstGeom>
+          <a:solidFill>
+            <a:srgbClr val="FFFF00">
+              <a:alpha val="32157"/>
+            </a:srgbClr>
+          </a:solidFill>
+          <a:ln>
+            <a:solidFill>
+              <a:schemeClr val="tx1"/>
+            </a:solidFill>
+          </a:ln>
+        </p:spPr>
+        <p:style>
+          <a:lnRef idx="1">
+            <a:schemeClr val="accent1"/>
+          </a:lnRef>
+          <a:fillRef idx="3">
+            <a:schemeClr val="accent1"/>
+          </a:fillRef>
+          <a:effectRef idx="2">
+            <a:schemeClr val="accent1"/>
+          </a:effectRef>
+          <a:fontRef idx="minor">
+            <a:schemeClr val="lt1"/>
+          </a:fontRef>
+        </p:style>
+        <p:txBody>
+          <a:bodyPr rtlCol="0" anchor="ctr"/>
+          <a:lstStyle/>
+          <a:p>
+            <a:pPr algn="ctr"/>
+            <a:endParaRPr lang="en-US"/>
+          </a:p>
+        </p:txBody>
+      </p:sp>
+      <p:cxnSp>
+        <p:nvCxnSpPr>
+          <p:cNvPr id="7" name="Straight Connector 6">
+            <a:extLst>
+              <a:ext uri="{FF2B5EF4-FFF2-40B4-BE49-F238E27FC236}">
+                <a16:creationId xmlns:a16="http://schemas.microsoft.com/office/drawing/2014/main" id="{A9476E2D-B1B0-2811-C07D-3D9B7C227C01}"/>
+              </a:ext>
+            </a:extLst>
+          </p:cNvPr>
+          <p:cNvCxnSpPr>
+            <a:cxnSpLocks/>
+          </p:cNvCxnSpPr>
+          <p:nvPr/>
+        </p:nvCxnSpPr>
+        <p:spPr>
+          <a:xfrm flipV="1">
+            <a:off x="24760989" y="21801221"/>
+            <a:ext cx="0" cy="5994567"/>
+          </a:xfrm>
+          <a:prstGeom prst="line">
+            <a:avLst/>
+          </a:prstGeom>
+          <a:ln>
+            <a:solidFill>
+              <a:schemeClr val="tx1"/>
+            </a:solidFill>
+            <a:prstDash val="sysDash"/>
+          </a:ln>
+        </p:spPr>
+        <p:style>
+          <a:lnRef idx="2">
+            <a:schemeClr val="accent1"/>
+          </a:lnRef>
+          <a:fillRef idx="0">
+            <a:schemeClr val="accent1"/>
+          </a:fillRef>
+          <a:effectRef idx="1">
+            <a:schemeClr val="accent1"/>
+          </a:effectRef>
+          <a:fontRef idx="minor">
+            <a:schemeClr val="tx1"/>
+          </a:fontRef>
+        </p:style>
+      </p:cxnSp>
+      <p:sp>
+        <p:nvSpPr>
+          <p:cNvPr id="10" name="Arrow: Right 9">
+            <a:extLst>
+              <a:ext uri="{FF2B5EF4-FFF2-40B4-BE49-F238E27FC236}">
+                <a16:creationId xmlns:a16="http://schemas.microsoft.com/office/drawing/2014/main" id="{23F01DDE-384E-C5FC-E821-6112759B9BA6}"/>
+              </a:ext>
+            </a:extLst>
+          </p:cNvPr>
+          <p:cNvSpPr/>
+          <p:nvPr/>
+        </p:nvSpPr>
+        <p:spPr>
+          <a:xfrm>
+            <a:off x="20646189" y="21801221"/>
+            <a:ext cx="2905971" cy="586837"/>
+          </a:xfrm>
+          <a:prstGeom prst="rightArrow">
+            <a:avLst/>
+          </a:prstGeom>
+          <a:solidFill>
+            <a:srgbClr val="FFFF00">
+              <a:alpha val="32157"/>
+            </a:srgbClr>
+          </a:solidFill>
+          <a:ln>
+            <a:solidFill>
+              <a:schemeClr val="tx1"/>
+            </a:solidFill>
+          </a:ln>
+        </p:spPr>
+        <p:style>
+          <a:lnRef idx="1">
+            <a:schemeClr val="accent1"/>
+          </a:lnRef>
+          <a:fillRef idx="3">
+            <a:schemeClr val="accent1"/>
+          </a:fillRef>
+          <a:effectRef idx="2">
+            <a:schemeClr val="accent1"/>
+          </a:effectRef>
+          <a:fontRef idx="minor">
+            <a:schemeClr val="lt1"/>
+          </a:fontRef>
+        </p:style>
+        <p:txBody>
+          <a:bodyPr rtlCol="0" anchor="ctr"/>
+          <a:lstStyle/>
+          <a:p>
+            <a:pPr algn="ctr"/>
+            <a:endParaRPr lang="en-US"/>
+          </a:p>
+        </p:txBody>
+      </p:sp>
+      <p:sp>
+        <p:nvSpPr>
+          <p:cNvPr id="11" name="TextBox 10">
+            <a:extLst>
+              <a:ext uri="{FF2B5EF4-FFF2-40B4-BE49-F238E27FC236}">
+                <a16:creationId xmlns:a16="http://schemas.microsoft.com/office/drawing/2014/main" id="{5B17B1BD-B4B9-BA45-8C54-05C6E59D73FE}"/>
+              </a:ext>
+            </a:extLst>
+          </p:cNvPr>
+          <p:cNvSpPr txBox="1"/>
+          <p:nvPr/>
+        </p:nvSpPr>
+        <p:spPr>
+          <a:xfrm>
+            <a:off x="29850027" y="8887326"/>
+            <a:ext cx="6952305" cy="9294852"/>
+          </a:xfrm>
+          <a:prstGeom prst="rect">
+            <a:avLst/>
+          </a:prstGeom>
+          <a:noFill/>
+          <a:ln>
+            <a:solidFill>
+              <a:schemeClr val="tx1"/>
+            </a:solidFill>
+          </a:ln>
+        </p:spPr>
+        <p:txBody>
+          <a:bodyPr wrap="square" lIns="457200" tIns="457200" rIns="457200" bIns="457200" rtlCol="0">
+            <a:spAutoFit/>
+          </a:bodyPr>
+          <a:lstStyle/>
+          <a:p>
+            <a:r>
+              <a:rPr lang="en-US" dirty="0">
+                <a:latin typeface="Avenir Book"/>
+              </a:rPr>
+              <a:t>The graph on the left signifies how accurate our model was at predicting playoff performance for the 2023-24 season trained on the 2022-23 (previous) season. Our x-axis represents batch number, where one (1) batch is a group of five (5) NBA games. We find that around batch 20, our model’s test accuracy, or ability to predict playoff result for the 2023-24 season, is capped out at around 53%. This means that after approximately 100 games played in the 2023-24 season, which is around the start of November, we can tell a team’s correct playoff result at a bit better than a 50/50 rate. </a:t>
+            </a:r>
+          </a:p>
+        </p:txBody>
+      </p:sp>
+      <p:sp>
+        <p:nvSpPr>
+          <p:cNvPr id="12" name="Rectangle 11">
+            <a:extLst>
+              <a:ext uri="{FF2B5EF4-FFF2-40B4-BE49-F238E27FC236}">
+                <a16:creationId xmlns:a16="http://schemas.microsoft.com/office/drawing/2014/main" id="{C1658A82-17AD-0C48-E291-B9B4656C7E15}"/>
+              </a:ext>
+            </a:extLst>
+          </p:cNvPr>
+          <p:cNvSpPr/>
+          <p:nvPr/>
+        </p:nvSpPr>
+        <p:spPr>
+          <a:xfrm>
+            <a:off x="16159387" y="10162674"/>
+            <a:ext cx="2200801" cy="1676400"/>
+          </a:xfrm>
+          <a:prstGeom prst="rect">
+            <a:avLst/>
+          </a:prstGeom>
+          <a:solidFill>
+            <a:srgbClr val="FFFF00">
+              <a:alpha val="32157"/>
+            </a:srgbClr>
+          </a:solidFill>
+          <a:ln>
+            <a:solidFill>
+              <a:schemeClr val="tx1"/>
+            </a:solidFill>
+          </a:ln>
+        </p:spPr>
+        <p:style>
+          <a:lnRef idx="1">
+            <a:schemeClr val="accent1"/>
+          </a:lnRef>
+          <a:fillRef idx="3">
+            <a:schemeClr val="accent1"/>
+          </a:fillRef>
+          <a:effectRef idx="2">
+            <a:schemeClr val="accent1"/>
+          </a:effectRef>
+          <a:fontRef idx="minor">
+            <a:schemeClr val="lt1"/>
+          </a:fontRef>
+        </p:style>
+        <p:txBody>
+          <a:bodyPr rtlCol="0" anchor="ctr"/>
+          <a:lstStyle/>
+          <a:p>
+            <a:pPr algn="ctr"/>
+            <a:endParaRPr lang="en-US"/>
+          </a:p>
+        </p:txBody>
+      </p:sp>
+      <p:sp>
+        <p:nvSpPr>
+          <p:cNvPr id="13" name="Arrow: Right 12">
+            <a:extLst>
+              <a:ext uri="{FF2B5EF4-FFF2-40B4-BE49-F238E27FC236}">
+                <a16:creationId xmlns:a16="http://schemas.microsoft.com/office/drawing/2014/main" id="{954C49DA-C8DE-6901-3D92-A02C94CEDF67}"/>
+              </a:ext>
+            </a:extLst>
+          </p:cNvPr>
+          <p:cNvSpPr/>
+          <p:nvPr/>
+        </p:nvSpPr>
+        <p:spPr>
+          <a:xfrm rot="10800000">
+            <a:off x="18587018" y="9942028"/>
+            <a:ext cx="11082855" cy="586837"/>
+          </a:xfrm>
+          <a:prstGeom prst="rightArrow">
+            <a:avLst/>
+          </a:prstGeom>
+          <a:solidFill>
+            <a:srgbClr val="FFFF00">
+              <a:alpha val="32157"/>
+            </a:srgbClr>
+          </a:solidFill>
+          <a:ln>
+            <a:solidFill>
+              <a:schemeClr val="tx1"/>
+            </a:solidFill>
+          </a:ln>
+        </p:spPr>
+        <p:style>
+          <a:lnRef idx="1">
+            <a:schemeClr val="accent1"/>
+          </a:lnRef>
+          <a:fillRef idx="3">
+            <a:schemeClr val="accent1"/>
+          </a:fillRef>
+          <a:effectRef idx="2">
+            <a:schemeClr val="accent1"/>
+          </a:effectRef>
+          <a:fontRef idx="minor">
+            <a:schemeClr val="lt1"/>
+          </a:fontRef>
+        </p:style>
+        <p:txBody>
+          <a:bodyPr rtlCol="0" anchor="ctr"/>
+          <a:lstStyle/>
+          <a:p>
+            <a:pPr algn="ctr"/>
+            <a:endParaRPr lang="en-US"/>
+          </a:p>
+        </p:txBody>
+      </p:sp>
     </p:spTree>
     <p:extLst>
       <p:ext uri="{BB962C8B-B14F-4D97-AF65-F5344CB8AC3E}">
@@ -9854,47 +7834,4 @@
     </a:folHlink>
   </a:clrScheme>
 </a:themeOverride>
-</file>
-
-<file path=ppt/theme/themeOverride2.xml><?xml version="1.0" encoding="utf-8"?>
-<a:themeOverride xmlns:a="http://schemas.openxmlformats.org/drawingml/2006/main">
-  <a:clrScheme name="Default Design 3">
-    <a:dk1>
-      <a:srgbClr val="000000"/>
-    </a:dk1>
-    <a:lt1>
-      <a:srgbClr val="FFFFFF"/>
-    </a:lt1>
-    <a:dk2>
-      <a:srgbClr val="000000"/>
-    </a:dk2>
-    <a:lt2>
-      <a:srgbClr val="333333"/>
-    </a:lt2>
-    <a:accent1>
-      <a:srgbClr val="DDDDDD"/>
-    </a:accent1>
-    <a:accent2>
-      <a:srgbClr val="808080"/>
-    </a:accent2>
-    <a:accent3>
-      <a:srgbClr val="FFFFFF"/>
-    </a:accent3>
-    <a:accent4>
-      <a:srgbClr val="000000"/>
-    </a:accent4>
-    <a:accent5>
-      <a:srgbClr val="EBEBEB"/>
-    </a:accent5>
-    <a:accent6>
-      <a:srgbClr val="737373"/>
-    </a:accent6>
-    <a:hlink>
-      <a:srgbClr val="4D4D4D"/>
-    </a:hlink>
-    <a:folHlink>
-      <a:srgbClr val="EAEAEA"/>
-    </a:folHlink>
-  </a:clrScheme>
-</a:themeOverride>
 </file>
</xml_diff>

<commit_message>
final poster progress - plus pdf
</commit_message>
<xml_diff>
--- a/Box Score to Bracket- Evaluating the Predictive Power of NBA Regular Season Performance on Playoff Outcomes.pptx
+++ b/Box Score to Bracket- Evaluating the Predictive Power of NBA Regular Season Performance on Playoff Outcomes.pptx
@@ -8,7 +8,7 @@
     <p:notesMasterId r:id="rId3"/>
   </p:notesMasterIdLst>
   <p:sldIdLst>
-    <p:sldId id="259" r:id="rId2"/>
+    <p:sldId id="260" r:id="rId2"/>
   </p:sldIdLst>
   <p:sldSz cx="51206400" cy="32004000"/>
   <p:notesSz cx="32918400" cy="51206400"/>
@@ -734,7 +734,7 @@
         <p:cNvPr id="1" name="">
           <a:extLst>
             <a:ext uri="{FF2B5EF4-FFF2-40B4-BE49-F238E27FC236}">
-              <a16:creationId xmlns:a16="http://schemas.microsoft.com/office/drawing/2014/main" id="{AC92AEC7-EBC3-78EF-76BD-F3E3353ADC0A}"/>
+              <a16:creationId xmlns:a16="http://schemas.microsoft.com/office/drawing/2014/main" id="{8AC8472D-DA47-DE78-81E8-1FE51F92F0D3}"/>
             </a:ext>
           </a:extLst>
         </p:cNvPr>
@@ -754,7 +754,7 @@
           <p:cNvPr id="15361" name="Slide Image Placeholder 1">
             <a:extLst>
               <a:ext uri="{FF2B5EF4-FFF2-40B4-BE49-F238E27FC236}">
-                <a16:creationId xmlns:a16="http://schemas.microsoft.com/office/drawing/2014/main" id="{5161707D-B20F-B951-E638-347EFDF93FDE}"/>
+                <a16:creationId xmlns:a16="http://schemas.microsoft.com/office/drawing/2014/main" id="{DC26E7D6-B0E0-632B-0392-9EDCCD82B1C6}"/>
               </a:ext>
             </a:extLst>
           </p:cNvPr>
@@ -791,7 +791,7 @@
           <p:cNvPr id="15362" name="Notes Placeholder 2">
             <a:extLst>
               <a:ext uri="{FF2B5EF4-FFF2-40B4-BE49-F238E27FC236}">
-                <a16:creationId xmlns:a16="http://schemas.microsoft.com/office/drawing/2014/main" id="{3CB8FDB3-7641-7F2D-2CDE-D1DA4146644B}"/>
+                <a16:creationId xmlns:a16="http://schemas.microsoft.com/office/drawing/2014/main" id="{7E02A4B7-8A44-A816-CEDD-58E71AFA3772}"/>
               </a:ext>
             </a:extLst>
           </p:cNvPr>
@@ -846,7 +846,7 @@
           <p:cNvPr id="15363" name="Slide Number Placeholder 3">
             <a:extLst>
               <a:ext uri="{FF2B5EF4-FFF2-40B4-BE49-F238E27FC236}">
-                <a16:creationId xmlns:a16="http://schemas.microsoft.com/office/drawing/2014/main" id="{BE2589E8-C708-5664-62F2-8FD198694D10}"/>
+                <a16:creationId xmlns:a16="http://schemas.microsoft.com/office/drawing/2014/main" id="{7BC52F0A-6E06-EE25-D169-AC562D73AA24}"/>
               </a:ext>
             </a:extLst>
           </p:cNvPr>
@@ -1006,7 +1006,7 @@
     </p:spTree>
     <p:extLst>
       <p:ext uri="{BB962C8B-B14F-4D97-AF65-F5344CB8AC3E}">
-        <p14:creationId xmlns:p14="http://schemas.microsoft.com/office/powerpoint/2010/main" val="1172449251"/>
+        <p14:creationId xmlns:p14="http://schemas.microsoft.com/office/powerpoint/2010/main" val="1144954102"/>
       </p:ext>
     </p:extLst>
   </p:cSld>
@@ -4555,7 +4555,7 @@
         <p:cNvPr id="1" name="">
           <a:extLst>
             <a:ext uri="{FF2B5EF4-FFF2-40B4-BE49-F238E27FC236}">
-              <a16:creationId xmlns:a16="http://schemas.microsoft.com/office/drawing/2014/main" id="{EDCE82C2-DBE0-5FA9-7820-3428C527F362}"/>
+              <a16:creationId xmlns:a16="http://schemas.microsoft.com/office/drawing/2014/main" id="{FE8EFE8E-74C9-7E6B-E636-7EC903B1983C}"/>
             </a:ext>
           </a:extLst>
         </p:cNvPr>
@@ -4575,7 +4575,7 @@
           <p:cNvPr id="3076" name="Picture 4">
             <a:extLst>
               <a:ext uri="{FF2B5EF4-FFF2-40B4-BE49-F238E27FC236}">
-                <a16:creationId xmlns:a16="http://schemas.microsoft.com/office/drawing/2014/main" id="{29EF5C91-D397-DC08-FAAC-0308A2F817B5}"/>
+                <a16:creationId xmlns:a16="http://schemas.microsoft.com/office/drawing/2014/main" id="{D6FB30E7-60C7-2030-635C-40D948919334}"/>
               </a:ext>
             </a:extLst>
           </p:cNvPr>
@@ -4622,7 +4622,7 @@
           <p:cNvPr id="14339" name="Text Box 7">
             <a:extLst>
               <a:ext uri="{FF2B5EF4-FFF2-40B4-BE49-F238E27FC236}">
-                <a16:creationId xmlns:a16="http://schemas.microsoft.com/office/drawing/2014/main" id="{A817019B-2C78-FAF6-F919-6C121DD1EE35}"/>
+                <a16:creationId xmlns:a16="http://schemas.microsoft.com/office/drawing/2014/main" id="{6C1F524A-9142-6583-EC61-826C86613B59}"/>
               </a:ext>
             </a:extLst>
           </p:cNvPr>
@@ -4650,6 +4650,13 @@
             <a:headEnd/>
             <a:tailEnd/>
           </a:ln>
+          <a:effectLst>
+            <a:outerShdw blurRad="50800" dist="88900" dir="2700000" algn="tl" rotWithShape="0">
+              <a:prstClr val="black">
+                <a:alpha val="40000"/>
+              </a:prstClr>
+            </a:outerShdw>
+          </a:effectLst>
         </p:spPr>
         <p:txBody>
           <a:bodyPr lIns="914400" tIns="457200" rIns="914400" bIns="457200"/>
@@ -4833,7 +4840,7 @@
           <p:cNvPr id="14340" name="Text Box 11">
             <a:extLst>
               <a:ext uri="{FF2B5EF4-FFF2-40B4-BE49-F238E27FC236}">
-                <a16:creationId xmlns:a16="http://schemas.microsoft.com/office/drawing/2014/main" id="{944CAD36-E156-CCD1-8A8F-C4F8011690FD}"/>
+                <a16:creationId xmlns:a16="http://schemas.microsoft.com/office/drawing/2014/main" id="{B98A9C97-DD02-D627-D6B0-1F8269A12BC7}"/>
               </a:ext>
             </a:extLst>
           </p:cNvPr>
@@ -4861,6 +4868,13 @@
             <a:headEnd/>
             <a:tailEnd/>
           </a:ln>
+          <a:effectLst>
+            <a:outerShdw blurRad="50800" dist="88900" dir="2700000" algn="tl" rotWithShape="0">
+              <a:prstClr val="black">
+                <a:alpha val="40000"/>
+              </a:prstClr>
+            </a:outerShdw>
+          </a:effectLst>
         </p:spPr>
         <p:txBody>
           <a:bodyPr lIns="914400" tIns="457200" rIns="914400" bIns="457200"/>
@@ -5143,7 +5157,7 @@
           <p:cNvPr id="14341" name="Text Box 12">
             <a:extLst>
               <a:ext uri="{FF2B5EF4-FFF2-40B4-BE49-F238E27FC236}">
-                <a16:creationId xmlns:a16="http://schemas.microsoft.com/office/drawing/2014/main" id="{E6E35E14-F05B-C28E-2F69-74F3B7D21B6D}"/>
+                <a16:creationId xmlns:a16="http://schemas.microsoft.com/office/drawing/2014/main" id="{8F9D9AB0-5724-A588-6754-D910E75F931D}"/>
               </a:ext>
             </a:extLst>
           </p:cNvPr>
@@ -5171,6 +5185,13 @@
             <a:headEnd/>
             <a:tailEnd/>
           </a:ln>
+          <a:effectLst>
+            <a:outerShdw blurRad="50800" dist="88900" dir="2700000" algn="tl" rotWithShape="0">
+              <a:prstClr val="black">
+                <a:alpha val="40000"/>
+              </a:prstClr>
+            </a:outerShdw>
+          </a:effectLst>
         </p:spPr>
         <p:txBody>
           <a:bodyPr lIns="914400" tIns="457200" rIns="914400" bIns="914400"/>
@@ -5423,7 +5444,7 @@
           <p:cNvPr id="14342" name="Text Box 13">
             <a:extLst>
               <a:ext uri="{FF2B5EF4-FFF2-40B4-BE49-F238E27FC236}">
-                <a16:creationId xmlns:a16="http://schemas.microsoft.com/office/drawing/2014/main" id="{01D8A2AC-A127-078B-ADC0-11106AA2B7A6}"/>
+                <a16:creationId xmlns:a16="http://schemas.microsoft.com/office/drawing/2014/main" id="{33E7C0FB-4FFE-6FAF-26BA-05D68D1D586A}"/>
               </a:ext>
             </a:extLst>
           </p:cNvPr>
@@ -5451,6 +5472,13 @@
             <a:headEnd/>
             <a:tailEnd/>
           </a:ln>
+          <a:effectLst>
+            <a:outerShdw blurRad="50800" dist="88900" dir="2700000" algn="tl" rotWithShape="0">
+              <a:prstClr val="black">
+                <a:alpha val="40000"/>
+              </a:prstClr>
+            </a:outerShdw>
+          </a:effectLst>
         </p:spPr>
         <p:txBody>
           <a:bodyPr lIns="914400" tIns="457200" rIns="914400" bIns="457200"/>
@@ -5660,10 +5688,10 @@
       </p:sp>
       <p:sp>
         <p:nvSpPr>
-          <p:cNvPr id="14345" name="Text Box 16">
+          <p:cNvPr id="14346" name="Text Box 15">
             <a:extLst>
               <a:ext uri="{FF2B5EF4-FFF2-40B4-BE49-F238E27FC236}">
-                <a16:creationId xmlns:a16="http://schemas.microsoft.com/office/drawing/2014/main" id="{BB36A4CC-CE7A-59AA-6200-05ED7D10A390}"/>
+                <a16:creationId xmlns:a16="http://schemas.microsoft.com/office/drawing/2014/main" id="{F280E843-5365-7BC7-7D0A-FD58075FC608}"/>
               </a:ext>
             </a:extLst>
           </p:cNvPr>
@@ -5674,8 +5702,8 @@
         </p:nvSpPr>
         <p:spPr bwMode="auto">
           <a:xfrm>
-            <a:off x="38595300" y="22388059"/>
-            <a:ext cx="10811782" cy="3998911"/>
+            <a:off x="38595300" y="15185571"/>
+            <a:ext cx="10811782" cy="14401799"/>
           </a:xfrm>
           <a:prstGeom prst="rect">
             <a:avLst/>
@@ -5691,11 +5719,18 @@
             <a:headEnd/>
             <a:tailEnd/>
           </a:ln>
+          <a:effectLst>
+            <a:outerShdw blurRad="50800" dist="88900" dir="2700000" algn="tl" rotWithShape="0">
+              <a:prstClr val="black">
+                <a:alpha val="40000"/>
+              </a:prstClr>
+            </a:outerShdw>
+          </a:effectLst>
         </p:spPr>
         <p:txBody>
           <a:bodyPr lIns="914400" tIns="457200" rIns="914400" bIns="457200"/>
           <a:lstStyle>
-            <a:lvl1pPr eaLnBrk="0" hangingPunct="0">
+            <a:lvl1pPr marL="500063" indent="-500063" eaLnBrk="0" hangingPunct="0">
               <a:defRPr sz="3200">
                 <a:solidFill>
                   <a:schemeClr val="tx1"/>
@@ -5814,7 +5849,7 @@
                 </a:solidFill>
                 <a:latin typeface="Avenir Heavy" pitchFamily="124" charset="0"/>
               </a:rPr>
-              <a:t>Future Work</a:t>
+              <a:t>Implications</a:t>
             </a:r>
           </a:p>
           <a:p>
@@ -5829,7 +5864,7 @@
               <a:rPr lang="en-US" altLang="en-US" sz="3600" dirty="0">
                 <a:latin typeface="Avenir Book" pitchFamily="124" charset="0"/>
               </a:rPr>
-              <a:t>Creating specialized models for each team.</a:t>
+              <a:t>Our model could tell early on what level of performance correlated to a particular playoff finish, but it was not entirely accurate.</a:t>
             </a:r>
           </a:p>
           <a:p>
@@ -5844,168 +5879,7 @@
               <a:rPr lang="en-US" altLang="en-US" sz="3600" dirty="0">
                 <a:latin typeface="Avenir Book" pitchFamily="124" charset="0"/>
               </a:rPr>
-              <a:t>Experimenting with different model types other than neural networks, hoping to find more accurate models for predicting.</a:t>
-            </a:r>
-          </a:p>
-        </p:txBody>
-      </p:sp>
-      <p:sp>
-        <p:nvSpPr>
-          <p:cNvPr id="14346" name="Text Box 15">
-            <a:extLst>
-              <a:ext uri="{FF2B5EF4-FFF2-40B4-BE49-F238E27FC236}">
-                <a16:creationId xmlns:a16="http://schemas.microsoft.com/office/drawing/2014/main" id="{FC2885BC-4E9F-834A-DB68-05D36F4A8FEB}"/>
-              </a:ext>
-            </a:extLst>
-          </p:cNvPr>
-          <p:cNvSpPr txBox="1">
-            <a:spLocks noChangeArrowheads="1"/>
-          </p:cNvSpPr>
-          <p:nvPr/>
-        </p:nvSpPr>
-        <p:spPr bwMode="auto">
-          <a:xfrm>
-            <a:off x="38595300" y="15185572"/>
-            <a:ext cx="10811782" cy="7202486"/>
-          </a:xfrm>
-          <a:prstGeom prst="rect">
-            <a:avLst/>
-          </a:prstGeom>
-          <a:solidFill>
-            <a:schemeClr val="bg1"/>
-          </a:solidFill>
-          <a:ln w="38100">
-            <a:solidFill>
-              <a:srgbClr val="000000"/>
-            </a:solidFill>
-            <a:round/>
-            <a:headEnd/>
-            <a:tailEnd/>
-          </a:ln>
-        </p:spPr>
-        <p:txBody>
-          <a:bodyPr lIns="914400" tIns="457200" rIns="914400" bIns="457200"/>
-          <a:lstStyle>
-            <a:lvl1pPr marL="500063" indent="-500063" eaLnBrk="0" hangingPunct="0">
-              <a:defRPr sz="3200">
-                <a:solidFill>
-                  <a:schemeClr val="tx1"/>
-                </a:solidFill>
-                <a:latin typeface="Helvetica" panose="020B0604020202020204" pitchFamily="34" charset="0"/>
-                <a:ea typeface="MS PGothic" panose="020B0600070205080204" pitchFamily="34" charset="-128"/>
-              </a:defRPr>
-            </a:lvl1pPr>
-            <a:lvl2pPr marL="742950" indent="-285750" eaLnBrk="0" hangingPunct="0">
-              <a:defRPr sz="3200">
-                <a:solidFill>
-                  <a:schemeClr val="tx1"/>
-                </a:solidFill>
-                <a:latin typeface="Helvetica" panose="020B0604020202020204" pitchFamily="34" charset="0"/>
-                <a:ea typeface="MS PGothic" panose="020B0600070205080204" pitchFamily="34" charset="-128"/>
-              </a:defRPr>
-            </a:lvl2pPr>
-            <a:lvl3pPr marL="1143000" indent="-228600" eaLnBrk="0" hangingPunct="0">
-              <a:defRPr sz="3200">
-                <a:solidFill>
-                  <a:schemeClr val="tx1"/>
-                </a:solidFill>
-                <a:latin typeface="Helvetica" panose="020B0604020202020204" pitchFamily="34" charset="0"/>
-                <a:ea typeface="MS PGothic" panose="020B0600070205080204" pitchFamily="34" charset="-128"/>
-              </a:defRPr>
-            </a:lvl3pPr>
-            <a:lvl4pPr marL="1600200" indent="-228600" eaLnBrk="0" hangingPunct="0">
-              <a:defRPr sz="3200">
-                <a:solidFill>
-                  <a:schemeClr val="tx1"/>
-                </a:solidFill>
-                <a:latin typeface="Helvetica" panose="020B0604020202020204" pitchFamily="34" charset="0"/>
-                <a:ea typeface="MS PGothic" panose="020B0600070205080204" pitchFamily="34" charset="-128"/>
-              </a:defRPr>
-            </a:lvl4pPr>
-            <a:lvl5pPr marL="2057400" indent="-228600" eaLnBrk="0" hangingPunct="0">
-              <a:defRPr sz="3200">
-                <a:solidFill>
-                  <a:schemeClr val="tx1"/>
-                </a:solidFill>
-                <a:latin typeface="Helvetica" panose="020B0604020202020204" pitchFamily="34" charset="0"/>
-                <a:ea typeface="MS PGothic" panose="020B0600070205080204" pitchFamily="34" charset="-128"/>
-              </a:defRPr>
-            </a:lvl5pPr>
-            <a:lvl6pPr marL="2514600" indent="-228600" eaLnBrk="0" fontAlgn="base" hangingPunct="0">
-              <a:spcBef>
-                <a:spcPct val="0"/>
-              </a:spcBef>
-              <a:spcAft>
-                <a:spcPct val="0"/>
-              </a:spcAft>
-              <a:defRPr sz="3200">
-                <a:solidFill>
-                  <a:schemeClr val="tx1"/>
-                </a:solidFill>
-                <a:latin typeface="Helvetica" panose="020B0604020202020204" pitchFamily="34" charset="0"/>
-                <a:ea typeface="MS PGothic" panose="020B0600070205080204" pitchFamily="34" charset="-128"/>
-              </a:defRPr>
-            </a:lvl6pPr>
-            <a:lvl7pPr marL="2971800" indent="-228600" eaLnBrk="0" fontAlgn="base" hangingPunct="0">
-              <a:spcBef>
-                <a:spcPct val="0"/>
-              </a:spcBef>
-              <a:spcAft>
-                <a:spcPct val="0"/>
-              </a:spcAft>
-              <a:defRPr sz="3200">
-                <a:solidFill>
-                  <a:schemeClr val="tx1"/>
-                </a:solidFill>
-                <a:latin typeface="Helvetica" panose="020B0604020202020204" pitchFamily="34" charset="0"/>
-                <a:ea typeface="MS PGothic" panose="020B0600070205080204" pitchFamily="34" charset="-128"/>
-              </a:defRPr>
-            </a:lvl7pPr>
-            <a:lvl8pPr marL="3429000" indent="-228600" eaLnBrk="0" fontAlgn="base" hangingPunct="0">
-              <a:spcBef>
-                <a:spcPct val="0"/>
-              </a:spcBef>
-              <a:spcAft>
-                <a:spcPct val="0"/>
-              </a:spcAft>
-              <a:defRPr sz="3200">
-                <a:solidFill>
-                  <a:schemeClr val="tx1"/>
-                </a:solidFill>
-                <a:latin typeface="Helvetica" panose="020B0604020202020204" pitchFamily="34" charset="0"/>
-                <a:ea typeface="MS PGothic" panose="020B0600070205080204" pitchFamily="34" charset="-128"/>
-              </a:defRPr>
-            </a:lvl8pPr>
-            <a:lvl9pPr marL="3886200" indent="-228600" eaLnBrk="0" fontAlgn="base" hangingPunct="0">
-              <a:spcBef>
-                <a:spcPct val="0"/>
-              </a:spcBef>
-              <a:spcAft>
-                <a:spcPct val="0"/>
-              </a:spcAft>
-              <a:defRPr sz="3200">
-                <a:solidFill>
-                  <a:schemeClr val="tx1"/>
-                </a:solidFill>
-                <a:latin typeface="Helvetica" panose="020B0604020202020204" pitchFamily="34" charset="0"/>
-                <a:ea typeface="MS PGothic" panose="020B0600070205080204" pitchFamily="34" charset="-128"/>
-              </a:defRPr>
-            </a:lvl9pPr>
-          </a:lstStyle>
-          <a:p>
-            <a:pPr algn="ctr" eaLnBrk="1" hangingPunct="1">
-              <a:spcBef>
-                <a:spcPct val="50000"/>
-              </a:spcBef>
-            </a:pPr>
-            <a:r>
-              <a:rPr lang="en-US" altLang="en-US" sz="4400" b="1" u="sng" dirty="0">
-                <a:solidFill>
-                  <a:srgbClr val="000000"/>
-                </a:solidFill>
-                <a:latin typeface="Avenir Heavy" pitchFamily="124" charset="0"/>
-              </a:rPr>
-              <a:t>Implications</a:t>
+              <a:t>Our predictive margin of error was around +/- 3 games of playoff result – which is the difference between losing or advancing to the next round.</a:t>
             </a:r>
           </a:p>
           <a:p>
@@ -6020,7 +5894,7 @@
               <a:rPr lang="en-US" altLang="en-US" sz="3600" dirty="0">
                 <a:latin typeface="Avenir Book" pitchFamily="124" charset="0"/>
               </a:rPr>
-              <a:t>Our model could tell early on what level of performance correlated to a particular playoff finish, but it was not entirely accurate.</a:t>
+              <a:t>Rolling average performance over stretches of games will affect prediction ability.</a:t>
             </a:r>
           </a:p>
           <a:p>
@@ -6031,11 +5905,24 @@
               <a:buFont typeface="Arial" panose="020B0604020202020204" pitchFamily="34" charset="0"/>
               <a:buChar char="•"/>
             </a:pPr>
-            <a:r>
-              <a:rPr lang="en-US" altLang="en-US" sz="3600" dirty="0">
-                <a:latin typeface="Avenir Book" pitchFamily="124" charset="0"/>
+            <a:endParaRPr lang="en-US" altLang="en-US" sz="2800" dirty="0">
+              <a:latin typeface="Avenir Book" pitchFamily="124" charset="0"/>
+            </a:endParaRPr>
+          </a:p>
+          <a:p>
+            <a:pPr algn="ctr" eaLnBrk="1" hangingPunct="1">
+              <a:spcBef>
+                <a:spcPct val="50000"/>
+              </a:spcBef>
+            </a:pPr>
+            <a:r>
+              <a:rPr lang="en-US" altLang="en-US" sz="4400" b="1" u="sng" dirty="0">
+                <a:solidFill>
+                  <a:srgbClr val="000000"/>
+                </a:solidFill>
+                <a:latin typeface="Avenir Heavy" pitchFamily="124" charset="0"/>
               </a:rPr>
-              <a:t>Our predictive margin of error was around +/- 3 games of playoff result – which is the difference between losing or advancing to the next round.</a:t>
+              <a:t>Future Work</a:t>
             </a:r>
           </a:p>
           <a:p>
@@ -6050,7 +5937,7 @@
               <a:rPr lang="en-US" altLang="en-US" sz="3600" dirty="0">
                 <a:latin typeface="Avenir Book" pitchFamily="124" charset="0"/>
               </a:rPr>
-              <a:t>Rolling average performance over stretches of games will affect prediction ability.</a:t>
+              <a:t>Creating specialized models for each team.</a:t>
             </a:r>
           </a:p>
           <a:p>
@@ -6061,18 +5948,90 @@
               <a:buFont typeface="Arial" panose="020B0604020202020204" pitchFamily="34" charset="0"/>
               <a:buChar char="•"/>
             </a:pPr>
+            <a:r>
+              <a:rPr lang="en-US" altLang="en-US" sz="3600" dirty="0">
+                <a:latin typeface="Avenir Book" pitchFamily="124" charset="0"/>
+              </a:rPr>
+              <a:t>Experimenting with different model types other than neural networks, hoping to find more accurate models for predicting.</a:t>
+            </a:r>
+          </a:p>
+          <a:p>
+            <a:pPr marL="0" indent="0" eaLnBrk="1" hangingPunct="1">
+              <a:spcBef>
+                <a:spcPts val="1200"/>
+              </a:spcBef>
+            </a:pPr>
             <a:endParaRPr lang="en-US" altLang="en-US" sz="3600" dirty="0">
               <a:latin typeface="Avenir Book" pitchFamily="124" charset="0"/>
             </a:endParaRPr>
           </a:p>
           <a:p>
-            <a:pPr eaLnBrk="1" hangingPunct="1"/>
-            <a:br>
-              <a:rPr lang="en-US" altLang="en-US" sz="2800" dirty="0">
+            <a:pPr algn="ctr" eaLnBrk="1" hangingPunct="1"/>
+            <a:r>
+              <a:rPr lang="en-US" altLang="en-US" sz="4400" b="1" u="sng" dirty="0">
+                <a:solidFill>
+                  <a:srgbClr val="000000"/>
+                </a:solidFill>
+                <a:latin typeface="Avenir Heavy" pitchFamily="124" charset="0"/>
+              </a:rPr>
+              <a:t>Data Source</a:t>
+            </a:r>
+          </a:p>
+          <a:p>
+            <a:pPr marL="571500" indent="-571500" eaLnBrk="1" hangingPunct="1">
+              <a:spcBef>
+                <a:spcPct val="10000"/>
+              </a:spcBef>
+              <a:buFont typeface="Arial" panose="020B0604020202020204" pitchFamily="34" charset="0"/>
+              <a:buChar char="•"/>
+            </a:pPr>
+            <a:r>
+              <a:rPr lang="en-US" altLang="en-US" sz="3600" dirty="0" err="1">
+                <a:solidFill>
+                  <a:srgbClr val="000000"/>
+                </a:solidFill>
                 <a:latin typeface="Avenir Book" pitchFamily="124" charset="0"/>
               </a:rPr>
-            </a:br>
-            <a:endParaRPr lang="en-US" altLang="en-US" sz="2800" dirty="0">
+              <a:t>NBA.com’s</a:t>
+            </a:r>
+            <a:r>
+              <a:rPr lang="en-US" altLang="en-US" sz="3600" dirty="0">
+                <a:solidFill>
+                  <a:srgbClr val="000000"/>
+                </a:solidFill>
+                <a:latin typeface="Avenir Book" pitchFamily="124" charset="0"/>
+              </a:rPr>
+              <a:t> official stats website.</a:t>
+            </a:r>
+          </a:p>
+          <a:p>
+            <a:pPr marL="571500" indent="-571500" eaLnBrk="1" hangingPunct="1">
+              <a:spcBef>
+                <a:spcPct val="10000"/>
+              </a:spcBef>
+              <a:buFont typeface="Arial" panose="020B0604020202020204" pitchFamily="34" charset="0"/>
+              <a:buChar char="•"/>
+            </a:pPr>
+            <a:r>
+              <a:rPr lang="en-US" altLang="en-US" sz="3600" dirty="0">
+                <a:solidFill>
+                  <a:srgbClr val="000000"/>
+                </a:solidFill>
+                <a:latin typeface="Avenir Book" pitchFamily="124" charset="0"/>
+              </a:rPr>
+              <a:t>Used the stats.nba.com API to scrape traditional and advanced box score data.</a:t>
+            </a:r>
+            <a:endParaRPr lang="en-US" altLang="en-US" sz="3600" dirty="0">
+              <a:latin typeface="Avenir Book" pitchFamily="124" charset="0"/>
+            </a:endParaRPr>
+          </a:p>
+          <a:p>
+            <a:pPr marL="0" indent="0" eaLnBrk="1" hangingPunct="1">
+              <a:spcBef>
+                <a:spcPts val="1200"/>
+              </a:spcBef>
+            </a:pPr>
+            <a:endParaRPr lang="en-US" altLang="en-US" sz="3600" dirty="0">
               <a:latin typeface="Avenir Book" pitchFamily="124" charset="0"/>
             </a:endParaRPr>
           </a:p>
@@ -6090,228 +6049,10 @@
       </p:sp>
       <p:sp>
         <p:nvSpPr>
-          <p:cNvPr id="14347" name="Text Box 70">
-            <a:extLst>
-              <a:ext uri="{FF2B5EF4-FFF2-40B4-BE49-F238E27FC236}">
-                <a16:creationId xmlns:a16="http://schemas.microsoft.com/office/drawing/2014/main" id="{2EF7BC7D-7B73-2835-E450-6A862F70C561}"/>
-              </a:ext>
-            </a:extLst>
-          </p:cNvPr>
-          <p:cNvSpPr txBox="1">
-            <a:spLocks noChangeArrowheads="1"/>
-          </p:cNvSpPr>
-          <p:nvPr/>
-        </p:nvSpPr>
-        <p:spPr bwMode="auto">
-          <a:xfrm>
-            <a:off x="38595300" y="26386971"/>
-            <a:ext cx="10811782" cy="3200400"/>
-          </a:xfrm>
-          <a:prstGeom prst="rect">
-            <a:avLst/>
-          </a:prstGeom>
-          <a:solidFill>
-            <a:schemeClr val="bg1"/>
-          </a:solidFill>
-          <a:ln w="38100">
-            <a:solidFill>
-              <a:srgbClr val="000000"/>
-            </a:solidFill>
-            <a:round/>
-            <a:headEnd/>
-            <a:tailEnd/>
-          </a:ln>
-        </p:spPr>
-        <p:txBody>
-          <a:bodyPr lIns="914400" tIns="457200" rIns="914400" bIns="457200"/>
-          <a:lstStyle>
-            <a:lvl1pPr eaLnBrk="0" hangingPunct="0">
-              <a:defRPr sz="3200">
-                <a:solidFill>
-                  <a:schemeClr val="tx1"/>
-                </a:solidFill>
-                <a:latin typeface="Helvetica" panose="020B0604020202020204" pitchFamily="34" charset="0"/>
-                <a:ea typeface="MS PGothic" panose="020B0600070205080204" pitchFamily="34" charset="-128"/>
-              </a:defRPr>
-            </a:lvl1pPr>
-            <a:lvl2pPr marL="742950" indent="-285750" eaLnBrk="0" hangingPunct="0">
-              <a:defRPr sz="3200">
-                <a:solidFill>
-                  <a:schemeClr val="tx1"/>
-                </a:solidFill>
-                <a:latin typeface="Helvetica" panose="020B0604020202020204" pitchFamily="34" charset="0"/>
-                <a:ea typeface="MS PGothic" panose="020B0600070205080204" pitchFamily="34" charset="-128"/>
-              </a:defRPr>
-            </a:lvl2pPr>
-            <a:lvl3pPr marL="1143000" indent="-228600" eaLnBrk="0" hangingPunct="0">
-              <a:defRPr sz="3200">
-                <a:solidFill>
-                  <a:schemeClr val="tx1"/>
-                </a:solidFill>
-                <a:latin typeface="Helvetica" panose="020B0604020202020204" pitchFamily="34" charset="0"/>
-                <a:ea typeface="MS PGothic" panose="020B0600070205080204" pitchFamily="34" charset="-128"/>
-              </a:defRPr>
-            </a:lvl3pPr>
-            <a:lvl4pPr marL="1600200" indent="-228600" eaLnBrk="0" hangingPunct="0">
-              <a:defRPr sz="3200">
-                <a:solidFill>
-                  <a:schemeClr val="tx1"/>
-                </a:solidFill>
-                <a:latin typeface="Helvetica" panose="020B0604020202020204" pitchFamily="34" charset="0"/>
-                <a:ea typeface="MS PGothic" panose="020B0600070205080204" pitchFamily="34" charset="-128"/>
-              </a:defRPr>
-            </a:lvl4pPr>
-            <a:lvl5pPr marL="2057400" indent="-228600" eaLnBrk="0" hangingPunct="0">
-              <a:defRPr sz="3200">
-                <a:solidFill>
-                  <a:schemeClr val="tx1"/>
-                </a:solidFill>
-                <a:latin typeface="Helvetica" panose="020B0604020202020204" pitchFamily="34" charset="0"/>
-                <a:ea typeface="MS PGothic" panose="020B0600070205080204" pitchFamily="34" charset="-128"/>
-              </a:defRPr>
-            </a:lvl5pPr>
-            <a:lvl6pPr marL="2514600" indent="-228600" eaLnBrk="0" fontAlgn="base" hangingPunct="0">
-              <a:spcBef>
-                <a:spcPct val="0"/>
-              </a:spcBef>
-              <a:spcAft>
-                <a:spcPct val="0"/>
-              </a:spcAft>
-              <a:defRPr sz="3200">
-                <a:solidFill>
-                  <a:schemeClr val="tx1"/>
-                </a:solidFill>
-                <a:latin typeface="Helvetica" panose="020B0604020202020204" pitchFamily="34" charset="0"/>
-                <a:ea typeface="MS PGothic" panose="020B0600070205080204" pitchFamily="34" charset="-128"/>
-              </a:defRPr>
-            </a:lvl6pPr>
-            <a:lvl7pPr marL="2971800" indent="-228600" eaLnBrk="0" fontAlgn="base" hangingPunct="0">
-              <a:spcBef>
-                <a:spcPct val="0"/>
-              </a:spcBef>
-              <a:spcAft>
-                <a:spcPct val="0"/>
-              </a:spcAft>
-              <a:defRPr sz="3200">
-                <a:solidFill>
-                  <a:schemeClr val="tx1"/>
-                </a:solidFill>
-                <a:latin typeface="Helvetica" panose="020B0604020202020204" pitchFamily="34" charset="0"/>
-                <a:ea typeface="MS PGothic" panose="020B0600070205080204" pitchFamily="34" charset="-128"/>
-              </a:defRPr>
-            </a:lvl7pPr>
-            <a:lvl8pPr marL="3429000" indent="-228600" eaLnBrk="0" fontAlgn="base" hangingPunct="0">
-              <a:spcBef>
-                <a:spcPct val="0"/>
-              </a:spcBef>
-              <a:spcAft>
-                <a:spcPct val="0"/>
-              </a:spcAft>
-              <a:defRPr sz="3200">
-                <a:solidFill>
-                  <a:schemeClr val="tx1"/>
-                </a:solidFill>
-                <a:latin typeface="Helvetica" panose="020B0604020202020204" pitchFamily="34" charset="0"/>
-                <a:ea typeface="MS PGothic" panose="020B0600070205080204" pitchFamily="34" charset="-128"/>
-              </a:defRPr>
-            </a:lvl8pPr>
-            <a:lvl9pPr marL="3886200" indent="-228600" eaLnBrk="0" fontAlgn="base" hangingPunct="0">
-              <a:spcBef>
-                <a:spcPct val="0"/>
-              </a:spcBef>
-              <a:spcAft>
-                <a:spcPct val="0"/>
-              </a:spcAft>
-              <a:defRPr sz="3200">
-                <a:solidFill>
-                  <a:schemeClr val="tx1"/>
-                </a:solidFill>
-                <a:latin typeface="Helvetica" panose="020B0604020202020204" pitchFamily="34" charset="0"/>
-                <a:ea typeface="MS PGothic" panose="020B0600070205080204" pitchFamily="34" charset="-128"/>
-              </a:defRPr>
-            </a:lvl9pPr>
-          </a:lstStyle>
-          <a:p>
-            <a:pPr algn="ctr" eaLnBrk="1" hangingPunct="1"/>
-            <a:r>
-              <a:rPr lang="en-US" altLang="en-US" sz="4400" b="1" u="sng" dirty="0">
-                <a:solidFill>
-                  <a:srgbClr val="000000"/>
-                </a:solidFill>
-                <a:latin typeface="Avenir Heavy" pitchFamily="124" charset="0"/>
-              </a:rPr>
-              <a:t>Data Source</a:t>
-            </a:r>
-          </a:p>
-          <a:p>
-            <a:pPr marL="571500" indent="-571500" eaLnBrk="1" hangingPunct="1">
-              <a:spcBef>
-                <a:spcPct val="10000"/>
-              </a:spcBef>
-              <a:buFont typeface="Arial" panose="020B0604020202020204" pitchFamily="34" charset="0"/>
-              <a:buChar char="•"/>
-            </a:pPr>
-            <a:r>
-              <a:rPr lang="en-US" altLang="en-US" sz="3600" dirty="0" err="1">
-                <a:solidFill>
-                  <a:srgbClr val="000000"/>
-                </a:solidFill>
-                <a:latin typeface="Avenir Book" pitchFamily="124" charset="0"/>
-              </a:rPr>
-              <a:t>NBA.com’s</a:t>
-            </a:r>
-            <a:r>
-              <a:rPr lang="en-US" altLang="en-US" sz="3600" dirty="0">
-                <a:solidFill>
-                  <a:srgbClr val="000000"/>
-                </a:solidFill>
-                <a:latin typeface="Avenir Book" pitchFamily="124" charset="0"/>
-              </a:rPr>
-              <a:t> official stats website.</a:t>
-            </a:r>
-          </a:p>
-          <a:p>
-            <a:pPr marL="571500" indent="-571500" eaLnBrk="1" hangingPunct="1">
-              <a:spcBef>
-                <a:spcPct val="10000"/>
-              </a:spcBef>
-              <a:buFont typeface="Arial" panose="020B0604020202020204" pitchFamily="34" charset="0"/>
-              <a:buChar char="•"/>
-            </a:pPr>
-            <a:r>
-              <a:rPr lang="en-US" altLang="en-US" sz="3600" dirty="0">
-                <a:solidFill>
-                  <a:srgbClr val="000000"/>
-                </a:solidFill>
-                <a:latin typeface="Avenir Book" pitchFamily="124" charset="0"/>
-              </a:rPr>
-              <a:t>Used the stats.nba.com API to scrape traditional and advanced box score data.</a:t>
-            </a:r>
-            <a:endParaRPr lang="en-US" altLang="en-US" sz="3600" dirty="0">
-              <a:latin typeface="Avenir Book" pitchFamily="124" charset="0"/>
-            </a:endParaRPr>
-          </a:p>
-          <a:p>
-            <a:pPr eaLnBrk="1" hangingPunct="1">
-              <a:spcBef>
-                <a:spcPct val="10000"/>
-              </a:spcBef>
-            </a:pPr>
-            <a:r>
-              <a:rPr lang="en-US" altLang="en-US" sz="2800" dirty="0">
-                <a:latin typeface="Avenir Book" pitchFamily="124" charset="0"/>
-              </a:rPr>
-              <a:t>.</a:t>
-            </a:r>
-          </a:p>
-        </p:txBody>
-      </p:sp>
-      <p:sp>
-        <p:nvSpPr>
           <p:cNvPr id="2" name="Rectangle: Rounded Corners 1">
             <a:extLst>
               <a:ext uri="{FF2B5EF4-FFF2-40B4-BE49-F238E27FC236}">
-                <a16:creationId xmlns:a16="http://schemas.microsoft.com/office/drawing/2014/main" id="{B395254E-F338-9AEA-5944-30ACB5B1C57A}"/>
+                <a16:creationId xmlns:a16="http://schemas.microsoft.com/office/drawing/2014/main" id="{6AC4F9AE-FE87-C44B-20B0-88678B90F481}"/>
               </a:ext>
             </a:extLst>
           </p:cNvPr>
@@ -6334,6 +6075,13 @@
               <a:schemeClr val="tx1"/>
             </a:solidFill>
           </a:ln>
+          <a:effectLst>
+            <a:outerShdw blurRad="50800" dist="88900" dir="2700000" algn="tl" rotWithShape="0">
+              <a:prstClr val="black">
+                <a:alpha val="40000"/>
+              </a:prstClr>
+            </a:outerShdw>
+          </a:effectLst>
         </p:spPr>
         <p:style>
           <a:lnRef idx="1">
@@ -6445,7 +6193,7 @@
           <p:cNvPr id="1026" name="Picture 2">
             <a:extLst>
               <a:ext uri="{FF2B5EF4-FFF2-40B4-BE49-F238E27FC236}">
-                <a16:creationId xmlns:a16="http://schemas.microsoft.com/office/drawing/2014/main" id="{A3E5E091-2879-06F1-A031-63BF06DB1FD4}"/>
+                <a16:creationId xmlns:a16="http://schemas.microsoft.com/office/drawing/2014/main" id="{F2918AC8-E1A7-9E67-8B84-0935C27B3FB5}"/>
               </a:ext>
             </a:extLst>
           </p:cNvPr>
@@ -6476,6 +6224,18 @@
             <a:avLst/>
           </a:prstGeom>
           <a:noFill/>
+          <a:ln>
+            <a:solidFill>
+              <a:schemeClr val="tx1"/>
+            </a:solidFill>
+          </a:ln>
+          <a:effectLst>
+            <a:outerShdw blurRad="50800" dist="88900" dir="2700000" algn="tl" rotWithShape="0">
+              <a:prstClr val="black">
+                <a:alpha val="40000"/>
+              </a:prstClr>
+            </a:outerShdw>
+          </a:effectLst>
           <a:extLst>
             <a:ext uri="{909E8E84-426E-40DD-AFC4-6F175D3DCCD1}">
               <a14:hiddenFill xmlns:a14="http://schemas.microsoft.com/office/drawing/2010/main">
@@ -6492,7 +6252,7 @@
           <p:cNvPr id="3" name="Picture 2">
             <a:extLst>
               <a:ext uri="{FF2B5EF4-FFF2-40B4-BE49-F238E27FC236}">
-                <a16:creationId xmlns:a16="http://schemas.microsoft.com/office/drawing/2014/main" id="{7BA4E215-0913-1724-4C67-1F695AC45B58}"/>
+                <a16:creationId xmlns:a16="http://schemas.microsoft.com/office/drawing/2014/main" id="{E63C7CC9-C99A-5C73-0E7F-FCC9CC8B6450}"/>
               </a:ext>
             </a:extLst>
           </p:cNvPr>
@@ -6523,6 +6283,18 @@
             <a:avLst/>
           </a:prstGeom>
           <a:noFill/>
+          <a:ln>
+            <a:solidFill>
+              <a:schemeClr val="tx1"/>
+            </a:solidFill>
+          </a:ln>
+          <a:effectLst>
+            <a:outerShdw blurRad="50800" dist="88900" dir="2700000" algn="tl" rotWithShape="0">
+              <a:prstClr val="black">
+                <a:alpha val="40000"/>
+              </a:prstClr>
+            </a:outerShdw>
+          </a:effectLst>
           <a:extLst>
             <a:ext uri="{909E8E84-426E-40DD-AFC4-6F175D3DCCD1}">
               <a14:hiddenFill xmlns:a14="http://schemas.microsoft.com/office/drawing/2010/main">
@@ -6539,7 +6311,7 @@
           <p:cNvPr id="4" name="TextBox 3">
             <a:extLst>
               <a:ext uri="{FF2B5EF4-FFF2-40B4-BE49-F238E27FC236}">
-                <a16:creationId xmlns:a16="http://schemas.microsoft.com/office/drawing/2014/main" id="{D3975416-257D-D100-D313-0FEC04FFCDF6}"/>
+                <a16:creationId xmlns:a16="http://schemas.microsoft.com/office/drawing/2014/main" id="{15A921B9-3893-EF7F-0078-056596800D1F}"/>
               </a:ext>
             </a:extLst>
           </p:cNvPr>
@@ -6548,18 +6320,27 @@
         </p:nvSpPr>
         <p:spPr>
           <a:xfrm>
-            <a:off x="14271400" y="19659600"/>
+            <a:off x="14140772" y="19659600"/>
             <a:ext cx="6952305" cy="8778346"/>
           </a:xfrm>
           <a:prstGeom prst="rect">
             <a:avLst/>
           </a:prstGeom>
-          <a:noFill/>
+          <a:solidFill>
+            <a:schemeClr val="bg1"/>
+          </a:solidFill>
           <a:ln>
             <a:solidFill>
               <a:schemeClr val="tx1"/>
             </a:solidFill>
           </a:ln>
+          <a:effectLst>
+            <a:outerShdw blurRad="50800" dist="88900" dir="2700000" algn="tl" rotWithShape="0">
+              <a:prstClr val="black">
+                <a:alpha val="40000"/>
+              </a:prstClr>
+            </a:outerShdw>
+          </a:effectLst>
         </p:spPr>
         <p:txBody>
           <a:bodyPr wrap="square" lIns="457200" tIns="457200" rIns="457200" bIns="457200" rtlCol="0">
@@ -6617,7 +6398,7 @@
           <p:cNvPr id="5" name="Rectangle 4">
             <a:extLst>
               <a:ext uri="{FF2B5EF4-FFF2-40B4-BE49-F238E27FC236}">
-                <a16:creationId xmlns:a16="http://schemas.microsoft.com/office/drawing/2014/main" id="{285BA5B7-D378-EC31-9380-2FE6E6C9072F}"/>
+                <a16:creationId xmlns:a16="http://schemas.microsoft.com/office/drawing/2014/main" id="{2E45F88F-CA4A-3990-409B-8324EB671EC1}"/>
               </a:ext>
             </a:extLst>
           </p:cNvPr>
@@ -6671,7 +6452,7 @@
           <p:cNvPr id="7" name="Straight Connector 6">
             <a:extLst>
               <a:ext uri="{FF2B5EF4-FFF2-40B4-BE49-F238E27FC236}">
-                <a16:creationId xmlns:a16="http://schemas.microsoft.com/office/drawing/2014/main" id="{A9476E2D-B1B0-2811-C07D-3D9B7C227C01}"/>
+                <a16:creationId xmlns:a16="http://schemas.microsoft.com/office/drawing/2014/main" id="{B4A40B5B-8A2F-151A-D5DC-A6F29B24D930}"/>
               </a:ext>
             </a:extLst>
           </p:cNvPr>
@@ -6715,7 +6496,7 @@
           <p:cNvPr id="10" name="Arrow: Right 9">
             <a:extLst>
               <a:ext uri="{FF2B5EF4-FFF2-40B4-BE49-F238E27FC236}">
-                <a16:creationId xmlns:a16="http://schemas.microsoft.com/office/drawing/2014/main" id="{23F01DDE-384E-C5FC-E821-6112759B9BA6}"/>
+                <a16:creationId xmlns:a16="http://schemas.microsoft.com/office/drawing/2014/main" id="{2D6EFE53-94DF-00E0-4004-9B9870E46783}"/>
               </a:ext>
             </a:extLst>
           </p:cNvPr>
@@ -6769,7 +6550,7 @@
           <p:cNvPr id="11" name="TextBox 10">
             <a:extLst>
               <a:ext uri="{FF2B5EF4-FFF2-40B4-BE49-F238E27FC236}">
-                <a16:creationId xmlns:a16="http://schemas.microsoft.com/office/drawing/2014/main" id="{5B17B1BD-B4B9-BA45-8C54-05C6E59D73FE}"/>
+                <a16:creationId xmlns:a16="http://schemas.microsoft.com/office/drawing/2014/main" id="{90447E42-3D0A-E735-B295-E1F5BC37E82E}"/>
               </a:ext>
             </a:extLst>
           </p:cNvPr>
@@ -6779,17 +6560,26 @@
         <p:spPr>
           <a:xfrm>
             <a:off x="29850027" y="8887326"/>
-            <a:ext cx="6952305" cy="9294852"/>
+            <a:ext cx="6952305" cy="9787295"/>
           </a:xfrm>
           <a:prstGeom prst="rect">
             <a:avLst/>
           </a:prstGeom>
-          <a:noFill/>
+          <a:solidFill>
+            <a:schemeClr val="bg1"/>
+          </a:solidFill>
           <a:ln>
             <a:solidFill>
               <a:schemeClr val="tx1"/>
             </a:solidFill>
           </a:ln>
+          <a:effectLst>
+            <a:outerShdw blurRad="50800" dist="88900" dir="2700000" algn="tl" rotWithShape="0">
+              <a:prstClr val="black">
+                <a:alpha val="40000"/>
+              </a:prstClr>
+            </a:outerShdw>
+          </a:effectLst>
         </p:spPr>
         <p:txBody>
           <a:bodyPr wrap="square" lIns="457200" tIns="457200" rIns="457200" bIns="457200" rtlCol="0">
@@ -6801,7 +6591,7 @@
               <a:rPr lang="en-US" dirty="0">
                 <a:latin typeface="Avenir Book"/>
               </a:rPr>
-              <a:t>The graph on the left signifies how accurate our model was at predicting playoff performance for the 2023-24 season trained on the 2022-23 (previous) season. Our x-axis represents batch number, where one (1) batch is a group of five (5) NBA games. We find that around batch 20, our model’s test accuracy, or ability to predict playoff result for the 2023-24 season, is capped out at around 53%. This means that after approximately 100 games played in the 2023-24 season, which is around the start of November, we can tell a team’s correct playoff result at a bit better than a 50/50 rate. </a:t>
+              <a:t>The graph on the left signifies how accurate our model was at predicting playoff performance for the 2023-24 season trained on single-game performance in the 2022-23 (previous) season. Our x-axis represents batch number, where one (1) batch is a group of five (5) NBA games. We find that around batch 20, our model’s test accuracy, or ability to predict playoff result for the 2023-24 season, is capped out at around 53%. This means that after approximately 100 games played in the 2023-24 season, which is around the start of November, we can tell a team’s correct playoff result at a bit better than a 50/50 rate. </a:t>
             </a:r>
           </a:p>
         </p:txBody>
@@ -6811,7 +6601,7 @@
           <p:cNvPr id="12" name="Rectangle 11">
             <a:extLst>
               <a:ext uri="{FF2B5EF4-FFF2-40B4-BE49-F238E27FC236}">
-                <a16:creationId xmlns:a16="http://schemas.microsoft.com/office/drawing/2014/main" id="{C1658A82-17AD-0C48-E291-B9B4656C7E15}"/>
+                <a16:creationId xmlns:a16="http://schemas.microsoft.com/office/drawing/2014/main" id="{4FB0146A-ED2F-1348-9D2D-B83CEBD4E782}"/>
               </a:ext>
             </a:extLst>
           </p:cNvPr>
@@ -6865,7 +6655,7 @@
           <p:cNvPr id="13" name="Arrow: Right 12">
             <a:extLst>
               <a:ext uri="{FF2B5EF4-FFF2-40B4-BE49-F238E27FC236}">
-                <a16:creationId xmlns:a16="http://schemas.microsoft.com/office/drawing/2014/main" id="{954C49DA-C8DE-6901-3D92-A02C94CEDF67}"/>
+                <a16:creationId xmlns:a16="http://schemas.microsoft.com/office/drawing/2014/main" id="{B75869AA-1977-9A43-005C-8C591058841E}"/>
               </a:ext>
             </a:extLst>
           </p:cNvPr>
@@ -6914,10 +6704,96 @@
           </a:p>
         </p:txBody>
       </p:sp>
+      <p:cxnSp>
+        <p:nvCxnSpPr>
+          <p:cNvPr id="8" name="Straight Connector 7">
+            <a:extLst>
+              <a:ext uri="{FF2B5EF4-FFF2-40B4-BE49-F238E27FC236}">
+                <a16:creationId xmlns:a16="http://schemas.microsoft.com/office/drawing/2014/main" id="{EC8D7A85-8748-1EAF-CD4F-34AC148ECC92}"/>
+              </a:ext>
+            </a:extLst>
+          </p:cNvPr>
+          <p:cNvCxnSpPr>
+            <a:cxnSpLocks/>
+          </p:cNvCxnSpPr>
+          <p:nvPr/>
+        </p:nvCxnSpPr>
+        <p:spPr>
+          <a:xfrm>
+            <a:off x="38595300" y="22169904"/>
+            <a:ext cx="10811782" cy="0"/>
+          </a:xfrm>
+          <a:prstGeom prst="line">
+            <a:avLst/>
+          </a:prstGeom>
+          <a:ln>
+            <a:solidFill>
+              <a:schemeClr val="tx1"/>
+            </a:solidFill>
+          </a:ln>
+        </p:spPr>
+        <p:style>
+          <a:lnRef idx="2">
+            <a:schemeClr val="accent1"/>
+          </a:lnRef>
+          <a:fillRef idx="0">
+            <a:schemeClr val="accent1"/>
+          </a:fillRef>
+          <a:effectRef idx="1">
+            <a:schemeClr val="accent1"/>
+          </a:effectRef>
+          <a:fontRef idx="minor">
+            <a:schemeClr val="tx1"/>
+          </a:fontRef>
+        </p:style>
+      </p:cxnSp>
+      <p:cxnSp>
+        <p:nvCxnSpPr>
+          <p:cNvPr id="14" name="Straight Connector 13">
+            <a:extLst>
+              <a:ext uri="{FF2B5EF4-FFF2-40B4-BE49-F238E27FC236}">
+                <a16:creationId xmlns:a16="http://schemas.microsoft.com/office/drawing/2014/main" id="{30FC2506-5DCB-4ABE-B570-19A3D3B9C6BF}"/>
+              </a:ext>
+            </a:extLst>
+          </p:cNvPr>
+          <p:cNvCxnSpPr>
+            <a:cxnSpLocks/>
+          </p:cNvCxnSpPr>
+          <p:nvPr/>
+        </p:nvCxnSpPr>
+        <p:spPr>
+          <a:xfrm>
+            <a:off x="38595300" y="26172409"/>
+            <a:ext cx="10811782" cy="0"/>
+          </a:xfrm>
+          <a:prstGeom prst="line">
+            <a:avLst/>
+          </a:prstGeom>
+          <a:ln>
+            <a:solidFill>
+              <a:schemeClr val="tx1"/>
+            </a:solidFill>
+          </a:ln>
+        </p:spPr>
+        <p:style>
+          <a:lnRef idx="2">
+            <a:schemeClr val="accent1"/>
+          </a:lnRef>
+          <a:fillRef idx="0">
+            <a:schemeClr val="accent1"/>
+          </a:fillRef>
+          <a:effectRef idx="1">
+            <a:schemeClr val="accent1"/>
+          </a:effectRef>
+          <a:fontRef idx="minor">
+            <a:schemeClr val="tx1"/>
+          </a:fontRef>
+        </p:style>
+      </p:cxnSp>
     </p:spTree>
     <p:extLst>
       <p:ext uri="{BB962C8B-B14F-4D97-AF65-F5344CB8AC3E}">
-        <p14:creationId xmlns:p14="http://schemas.microsoft.com/office/powerpoint/2010/main" val="3382255649"/>
+        <p14:creationId xmlns:p14="http://schemas.microsoft.com/office/powerpoint/2010/main" val="384948660"/>
       </p:ext>
     </p:extLst>
   </p:cSld>

</xml_diff>